<commit_message>
docs: Update presentation and plan
- Dialogue_2026_Presentation.pptx: Updated with latest changes
- plan.md: Minor text update

Co-Authored-By: Claude Sonnet 4.5 <noreply@anthropic.com>
</commit_message>
<xml_diff>
--- a/Dialogue_2026_Presentation.pptx
+++ b/Dialogue_2026_Presentation.pptx
@@ -5,28 +5,28 @@
     <p:sldMasterId id="2147483648" r:id="rId1"/>
   </p:sldMasterIdLst>
   <p:sldIdLst>
-    <p:sldId id="256" r:id="rId7"/>
-    <p:sldId id="257" r:id="rId8"/>
-    <p:sldId id="258" r:id="rId9"/>
-    <p:sldId id="259" r:id="rId10"/>
-    <p:sldId id="260" r:id="rId11"/>
-    <p:sldId id="261" r:id="rId12"/>
-    <p:sldId id="262" r:id="rId13"/>
-    <p:sldId id="263" r:id="rId14"/>
-    <p:sldId id="264" r:id="rId15"/>
-    <p:sldId id="265" r:id="rId16"/>
-    <p:sldId id="266" r:id="rId17"/>
-    <p:sldId id="267" r:id="rId18"/>
-    <p:sldId id="268" r:id="rId19"/>
-    <p:sldId id="269" r:id="rId20"/>
-    <p:sldId id="270" r:id="rId21"/>
-    <p:sldId id="271" r:id="rId22"/>
-    <p:sldId id="272" r:id="rId23"/>
-    <p:sldId id="273" r:id="rId24"/>
-    <p:sldId id="274" r:id="rId25"/>
-    <p:sldId id="275" r:id="rId26"/>
-    <p:sldId id="276" r:id="rId27"/>
-    <p:sldId id="277" r:id="rId28"/>
+    <p:sldId id="256" r:id="rId2"/>
+    <p:sldId id="257" r:id="rId3"/>
+    <p:sldId id="258" r:id="rId4"/>
+    <p:sldId id="259" r:id="rId5"/>
+    <p:sldId id="260" r:id="rId6"/>
+    <p:sldId id="261" r:id="rId7"/>
+    <p:sldId id="262" r:id="rId8"/>
+    <p:sldId id="263" r:id="rId9"/>
+    <p:sldId id="264" r:id="rId10"/>
+    <p:sldId id="265" r:id="rId11"/>
+    <p:sldId id="266" r:id="rId12"/>
+    <p:sldId id="267" r:id="rId13"/>
+    <p:sldId id="268" r:id="rId14"/>
+    <p:sldId id="269" r:id="rId15"/>
+    <p:sldId id="270" r:id="rId16"/>
+    <p:sldId id="271" r:id="rId17"/>
+    <p:sldId id="272" r:id="rId18"/>
+    <p:sldId id="273" r:id="rId19"/>
+    <p:sldId id="274" r:id="rId20"/>
+    <p:sldId id="275" r:id="rId21"/>
+    <p:sldId id="276" r:id="rId22"/>
+    <p:sldId id="277" r:id="rId23"/>
   </p:sldIdLst>
   <p:sldSz cx="9144000" cy="6858000" type="screen4x3"/>
   <p:notesSz cx="6858000" cy="9144000"/>
@@ -125,6 +125,22 @@
       </a:defRPr>
     </a:lvl9pPr>
   </p:defaultTextStyle>
+  <p:extLst>
+    <p:ext uri="{EFAFB233-063F-42B5-8137-9DF3F51BA10A}">
+      <p15:sldGuideLst xmlns:p15="http://schemas.microsoft.com/office/powerpoint/2012/main">
+        <p15:guide id="1" orient="horz" pos="2160">
+          <p15:clr>
+            <a:srgbClr val="A4A3A4"/>
+          </p15:clr>
+        </p15:guide>
+        <p15:guide id="2" pos="2880">
+          <p15:clr>
+            <a:srgbClr val="A4A3A4"/>
+          </p15:clr>
+        </p15:guide>
+      </p15:sldGuideLst>
+    </p:ext>
+  </p:extLst>
 </p:presentation>
 </file>
 
@@ -166,10 +182,9 @@
           <a:lstStyle/>
           <a:p>
             <a:r>
-              <a:rPr lang="en-US" smtClean="0"/>
+              <a:rPr lang="en-US"/>
               <a:t>Click to edit Master title style</a:t>
             </a:r>
-            <a:endParaRPr lang="en-US"/>
           </a:p>
         </p:txBody>
       </p:sp>
@@ -285,10 +300,9 @@
           </a:lstStyle>
           <a:p>
             <a:r>
-              <a:rPr lang="en-US" smtClean="0"/>
+              <a:rPr lang="en-US"/>
               <a:t>Click to edit Master subtitle style</a:t>
             </a:r>
-            <a:endParaRPr lang="en-US"/>
           </a:p>
         </p:txBody>
       </p:sp>
@@ -309,7 +323,7 @@
           <a:p>
             <a:fld id="{5BCAD085-E8A6-8845-BD4E-CB4CCA059FC4}" type="datetimeFigureOut">
               <a:rPr lang="en-US" smtClean="0"/>
-              <a:t>1/27/13</a:t>
+              <a:t>1/20/26</a:t>
             </a:fld>
             <a:endParaRPr lang="en-US"/>
           </a:p>
@@ -403,10 +417,9 @@
           <a:lstStyle/>
           <a:p>
             <a:r>
-              <a:rPr lang="en-US" smtClean="0"/>
+              <a:rPr lang="en-US"/>
               <a:t>Click to edit Master title style</a:t>
             </a:r>
-            <a:endParaRPr lang="en-US"/>
           </a:p>
         </p:txBody>
       </p:sp>
@@ -427,38 +440,37 @@
           <a:p>
             <a:pPr lvl="0"/>
             <a:r>
-              <a:rPr lang="en-US" smtClean="0"/>
+              <a:rPr lang="en-US"/>
               <a:t>Click to edit Master text styles</a:t>
             </a:r>
           </a:p>
           <a:p>
             <a:pPr lvl="1"/>
             <a:r>
-              <a:rPr lang="en-US" smtClean="0"/>
+              <a:rPr lang="en-US"/>
               <a:t>Second level</a:t>
             </a:r>
           </a:p>
           <a:p>
             <a:pPr lvl="2"/>
             <a:r>
-              <a:rPr lang="en-US" smtClean="0"/>
+              <a:rPr lang="en-US"/>
               <a:t>Third level</a:t>
             </a:r>
           </a:p>
           <a:p>
             <a:pPr lvl="3"/>
             <a:r>
-              <a:rPr lang="en-US" smtClean="0"/>
+              <a:rPr lang="en-US"/>
               <a:t>Fourth level</a:t>
             </a:r>
           </a:p>
           <a:p>
             <a:pPr lvl="4"/>
             <a:r>
-              <a:rPr lang="en-US" smtClean="0"/>
+              <a:rPr lang="en-US"/>
               <a:t>Fifth level</a:t>
             </a:r>
-            <a:endParaRPr lang="en-US"/>
           </a:p>
         </p:txBody>
       </p:sp>
@@ -479,7 +491,7 @@
           <a:p>
             <a:fld id="{5BCAD085-E8A6-8845-BD4E-CB4CCA059FC4}" type="datetimeFigureOut">
               <a:rPr lang="en-US" smtClean="0"/>
-              <a:t>1/27/13</a:t>
+              <a:t>1/20/26</a:t>
             </a:fld>
             <a:endParaRPr lang="en-US"/>
           </a:p>
@@ -578,10 +590,9 @@
           <a:lstStyle/>
           <a:p>
             <a:r>
-              <a:rPr lang="en-US" smtClean="0"/>
+              <a:rPr lang="en-US"/>
               <a:t>Click to edit Master title style</a:t>
             </a:r>
-            <a:endParaRPr lang="en-US"/>
           </a:p>
         </p:txBody>
       </p:sp>
@@ -607,38 +618,37 @@
           <a:p>
             <a:pPr lvl="0"/>
             <a:r>
-              <a:rPr lang="en-US" smtClean="0"/>
+              <a:rPr lang="en-US"/>
               <a:t>Click to edit Master text styles</a:t>
             </a:r>
           </a:p>
           <a:p>
             <a:pPr lvl="1"/>
             <a:r>
-              <a:rPr lang="en-US" smtClean="0"/>
+              <a:rPr lang="en-US"/>
               <a:t>Second level</a:t>
             </a:r>
           </a:p>
           <a:p>
             <a:pPr lvl="2"/>
             <a:r>
-              <a:rPr lang="en-US" smtClean="0"/>
+              <a:rPr lang="en-US"/>
               <a:t>Third level</a:t>
             </a:r>
           </a:p>
           <a:p>
             <a:pPr lvl="3"/>
             <a:r>
-              <a:rPr lang="en-US" smtClean="0"/>
+              <a:rPr lang="en-US"/>
               <a:t>Fourth level</a:t>
             </a:r>
           </a:p>
           <a:p>
             <a:pPr lvl="4"/>
             <a:r>
-              <a:rPr lang="en-US" smtClean="0"/>
+              <a:rPr lang="en-US"/>
               <a:t>Fifth level</a:t>
             </a:r>
-            <a:endParaRPr lang="en-US"/>
           </a:p>
         </p:txBody>
       </p:sp>
@@ -659,7 +669,7 @@
           <a:p>
             <a:fld id="{5BCAD085-E8A6-8845-BD4E-CB4CCA059FC4}" type="datetimeFigureOut">
               <a:rPr lang="en-US" smtClean="0"/>
-              <a:t>1/27/13</a:t>
+              <a:t>1/20/26</a:t>
             </a:fld>
             <a:endParaRPr lang="en-US"/>
           </a:p>
@@ -753,10 +763,9 @@
           <a:lstStyle/>
           <a:p>
             <a:r>
-              <a:rPr lang="en-US" smtClean="0"/>
+              <a:rPr lang="en-US"/>
               <a:t>Click to edit Master title style</a:t>
             </a:r>
-            <a:endParaRPr lang="en-US"/>
           </a:p>
         </p:txBody>
       </p:sp>
@@ -777,38 +786,37 @@
           <a:p>
             <a:pPr lvl="0"/>
             <a:r>
-              <a:rPr lang="en-US" smtClean="0"/>
+              <a:rPr lang="en-US"/>
               <a:t>Click to edit Master text styles</a:t>
             </a:r>
           </a:p>
           <a:p>
             <a:pPr lvl="1"/>
             <a:r>
-              <a:rPr lang="en-US" smtClean="0"/>
+              <a:rPr lang="en-US"/>
               <a:t>Second level</a:t>
             </a:r>
           </a:p>
           <a:p>
             <a:pPr lvl="2"/>
             <a:r>
-              <a:rPr lang="en-US" smtClean="0"/>
+              <a:rPr lang="en-US"/>
               <a:t>Third level</a:t>
             </a:r>
           </a:p>
           <a:p>
             <a:pPr lvl="3"/>
             <a:r>
-              <a:rPr lang="en-US" smtClean="0"/>
+              <a:rPr lang="en-US"/>
               <a:t>Fourth level</a:t>
             </a:r>
           </a:p>
           <a:p>
             <a:pPr lvl="4"/>
             <a:r>
-              <a:rPr lang="en-US" smtClean="0"/>
+              <a:rPr lang="en-US"/>
               <a:t>Fifth level</a:t>
             </a:r>
-            <a:endParaRPr lang="en-US"/>
           </a:p>
         </p:txBody>
       </p:sp>
@@ -829,7 +837,7 @@
           <a:p>
             <a:fld id="{5BCAD085-E8A6-8845-BD4E-CB4CCA059FC4}" type="datetimeFigureOut">
               <a:rPr lang="en-US" smtClean="0"/>
-              <a:t>1/27/13</a:t>
+              <a:t>1/20/26</a:t>
             </a:fld>
             <a:endParaRPr lang="en-US"/>
           </a:p>
@@ -932,10 +940,9 @@
           </a:lstStyle>
           <a:p>
             <a:r>
-              <a:rPr lang="en-US" smtClean="0"/>
+              <a:rPr lang="en-US"/>
               <a:t>Click to edit Master title style</a:t>
             </a:r>
-            <a:endParaRPr lang="en-US"/>
           </a:p>
         </p:txBody>
       </p:sp>
@@ -1052,7 +1059,7 @@
           <a:p>
             <a:pPr lvl="0"/>
             <a:r>
-              <a:rPr lang="en-US" smtClean="0"/>
+              <a:rPr lang="en-US"/>
               <a:t>Click to edit Master text styles</a:t>
             </a:r>
           </a:p>
@@ -1075,7 +1082,7 @@
           <a:p>
             <a:fld id="{5BCAD085-E8A6-8845-BD4E-CB4CCA059FC4}" type="datetimeFigureOut">
               <a:rPr lang="en-US" smtClean="0"/>
-              <a:t>1/27/13</a:t>
+              <a:t>1/20/26</a:t>
             </a:fld>
             <a:endParaRPr lang="en-US"/>
           </a:p>
@@ -1169,10 +1176,9 @@
           <a:lstStyle/>
           <a:p>
             <a:r>
-              <a:rPr lang="en-US" smtClean="0"/>
+              <a:rPr lang="en-US"/>
               <a:t>Click to edit Master title style</a:t>
             </a:r>
-            <a:endParaRPr lang="en-US"/>
           </a:p>
         </p:txBody>
       </p:sp>
@@ -1226,38 +1232,37 @@
           <a:p>
             <a:pPr lvl="0"/>
             <a:r>
-              <a:rPr lang="en-US" smtClean="0"/>
+              <a:rPr lang="en-US"/>
               <a:t>Click to edit Master text styles</a:t>
             </a:r>
           </a:p>
           <a:p>
             <a:pPr lvl="1"/>
             <a:r>
-              <a:rPr lang="en-US" smtClean="0"/>
+              <a:rPr lang="en-US"/>
               <a:t>Second level</a:t>
             </a:r>
           </a:p>
           <a:p>
             <a:pPr lvl="2"/>
             <a:r>
-              <a:rPr lang="en-US" smtClean="0"/>
+              <a:rPr lang="en-US"/>
               <a:t>Third level</a:t>
             </a:r>
           </a:p>
           <a:p>
             <a:pPr lvl="3"/>
             <a:r>
-              <a:rPr lang="en-US" smtClean="0"/>
+              <a:rPr lang="en-US"/>
               <a:t>Fourth level</a:t>
             </a:r>
           </a:p>
           <a:p>
             <a:pPr lvl="4"/>
             <a:r>
-              <a:rPr lang="en-US" smtClean="0"/>
+              <a:rPr lang="en-US"/>
               <a:t>Fifth level</a:t>
             </a:r>
-            <a:endParaRPr lang="en-US"/>
           </a:p>
         </p:txBody>
       </p:sp>
@@ -1311,38 +1316,37 @@
           <a:p>
             <a:pPr lvl="0"/>
             <a:r>
-              <a:rPr lang="en-US" smtClean="0"/>
+              <a:rPr lang="en-US"/>
               <a:t>Click to edit Master text styles</a:t>
             </a:r>
           </a:p>
           <a:p>
             <a:pPr lvl="1"/>
             <a:r>
-              <a:rPr lang="en-US" smtClean="0"/>
+              <a:rPr lang="en-US"/>
               <a:t>Second level</a:t>
             </a:r>
           </a:p>
           <a:p>
             <a:pPr lvl="2"/>
             <a:r>
-              <a:rPr lang="en-US" smtClean="0"/>
+              <a:rPr lang="en-US"/>
               <a:t>Third level</a:t>
             </a:r>
           </a:p>
           <a:p>
             <a:pPr lvl="3"/>
             <a:r>
-              <a:rPr lang="en-US" smtClean="0"/>
+              <a:rPr lang="en-US"/>
               <a:t>Fourth level</a:t>
             </a:r>
           </a:p>
           <a:p>
             <a:pPr lvl="4"/>
             <a:r>
-              <a:rPr lang="en-US" smtClean="0"/>
+              <a:rPr lang="en-US"/>
               <a:t>Fifth level</a:t>
             </a:r>
-            <a:endParaRPr lang="en-US"/>
           </a:p>
         </p:txBody>
       </p:sp>
@@ -1363,7 +1367,7 @@
           <a:p>
             <a:fld id="{5BCAD085-E8A6-8845-BD4E-CB4CCA059FC4}" type="datetimeFigureOut">
               <a:rPr lang="en-US" smtClean="0"/>
-              <a:t>1/27/13</a:t>
+              <a:t>1/20/26</a:t>
             </a:fld>
             <a:endParaRPr lang="en-US"/>
           </a:p>
@@ -1461,10 +1465,9 @@
           </a:lstStyle>
           <a:p>
             <a:r>
-              <a:rPr lang="en-US" smtClean="0"/>
+              <a:rPr lang="en-US"/>
               <a:t>Click to edit Master title style</a:t>
             </a:r>
-            <a:endParaRPr lang="en-US"/>
           </a:p>
         </p:txBody>
       </p:sp>
@@ -1527,7 +1530,7 @@
           <a:p>
             <a:pPr lvl="0"/>
             <a:r>
-              <a:rPr lang="en-US" smtClean="0"/>
+              <a:rPr lang="en-US"/>
               <a:t>Click to edit Master text styles</a:t>
             </a:r>
           </a:p>
@@ -1583,38 +1586,37 @@
           <a:p>
             <a:pPr lvl="0"/>
             <a:r>
-              <a:rPr lang="en-US" smtClean="0"/>
+              <a:rPr lang="en-US"/>
               <a:t>Click to edit Master text styles</a:t>
             </a:r>
           </a:p>
           <a:p>
             <a:pPr lvl="1"/>
             <a:r>
-              <a:rPr lang="en-US" smtClean="0"/>
+              <a:rPr lang="en-US"/>
               <a:t>Second level</a:t>
             </a:r>
           </a:p>
           <a:p>
             <a:pPr lvl="2"/>
             <a:r>
-              <a:rPr lang="en-US" smtClean="0"/>
+              <a:rPr lang="en-US"/>
               <a:t>Third level</a:t>
             </a:r>
           </a:p>
           <a:p>
             <a:pPr lvl="3"/>
             <a:r>
-              <a:rPr lang="en-US" smtClean="0"/>
+              <a:rPr lang="en-US"/>
               <a:t>Fourth level</a:t>
             </a:r>
           </a:p>
           <a:p>
             <a:pPr lvl="4"/>
             <a:r>
-              <a:rPr lang="en-US" smtClean="0"/>
+              <a:rPr lang="en-US"/>
               <a:t>Fifth level</a:t>
             </a:r>
-            <a:endParaRPr lang="en-US"/>
           </a:p>
         </p:txBody>
       </p:sp>
@@ -1677,7 +1679,7 @@
           <a:p>
             <a:pPr lvl="0"/>
             <a:r>
-              <a:rPr lang="en-US" smtClean="0"/>
+              <a:rPr lang="en-US"/>
               <a:t>Click to edit Master text styles</a:t>
             </a:r>
           </a:p>
@@ -1733,38 +1735,37 @@
           <a:p>
             <a:pPr lvl="0"/>
             <a:r>
-              <a:rPr lang="en-US" smtClean="0"/>
+              <a:rPr lang="en-US"/>
               <a:t>Click to edit Master text styles</a:t>
             </a:r>
           </a:p>
           <a:p>
             <a:pPr lvl="1"/>
             <a:r>
-              <a:rPr lang="en-US" smtClean="0"/>
+              <a:rPr lang="en-US"/>
               <a:t>Second level</a:t>
             </a:r>
           </a:p>
           <a:p>
             <a:pPr lvl="2"/>
             <a:r>
-              <a:rPr lang="en-US" smtClean="0"/>
+              <a:rPr lang="en-US"/>
               <a:t>Third level</a:t>
             </a:r>
           </a:p>
           <a:p>
             <a:pPr lvl="3"/>
             <a:r>
-              <a:rPr lang="en-US" smtClean="0"/>
+              <a:rPr lang="en-US"/>
               <a:t>Fourth level</a:t>
             </a:r>
           </a:p>
           <a:p>
             <a:pPr lvl="4"/>
             <a:r>
-              <a:rPr lang="en-US" smtClean="0"/>
+              <a:rPr lang="en-US"/>
               <a:t>Fifth level</a:t>
             </a:r>
-            <a:endParaRPr lang="en-US"/>
           </a:p>
         </p:txBody>
       </p:sp>
@@ -1785,7 +1786,7 @@
           <a:p>
             <a:fld id="{5BCAD085-E8A6-8845-BD4E-CB4CCA059FC4}" type="datetimeFigureOut">
               <a:rPr lang="en-US" smtClean="0"/>
-              <a:t>1/27/13</a:t>
+              <a:t>1/20/26</a:t>
             </a:fld>
             <a:endParaRPr lang="en-US"/>
           </a:p>
@@ -1879,10 +1880,9 @@
           <a:lstStyle/>
           <a:p>
             <a:r>
-              <a:rPr lang="en-US" smtClean="0"/>
+              <a:rPr lang="en-US"/>
               <a:t>Click to edit Master title style</a:t>
             </a:r>
-            <a:endParaRPr lang="en-US"/>
           </a:p>
         </p:txBody>
       </p:sp>
@@ -1903,7 +1903,7 @@
           <a:p>
             <a:fld id="{5BCAD085-E8A6-8845-BD4E-CB4CCA059FC4}" type="datetimeFigureOut">
               <a:rPr lang="en-US" smtClean="0"/>
-              <a:t>1/27/13</a:t>
+              <a:t>1/20/26</a:t>
             </a:fld>
             <a:endParaRPr lang="en-US"/>
           </a:p>
@@ -1998,7 +1998,7 @@
           <a:p>
             <a:fld id="{5BCAD085-E8A6-8845-BD4E-CB4CCA059FC4}" type="datetimeFigureOut">
               <a:rPr lang="en-US" smtClean="0"/>
-              <a:t>1/27/13</a:t>
+              <a:t>1/20/26</a:t>
             </a:fld>
             <a:endParaRPr lang="en-US"/>
           </a:p>
@@ -2101,10 +2101,9 @@
           </a:lstStyle>
           <a:p>
             <a:r>
-              <a:rPr lang="en-US" smtClean="0"/>
+              <a:rPr lang="en-US"/>
               <a:t>Click to edit Master title style</a:t>
             </a:r>
-            <a:endParaRPr lang="en-US"/>
           </a:p>
         </p:txBody>
       </p:sp>
@@ -2158,38 +2157,37 @@
           <a:p>
             <a:pPr lvl="0"/>
             <a:r>
-              <a:rPr lang="en-US" smtClean="0"/>
+              <a:rPr lang="en-US"/>
               <a:t>Click to edit Master text styles</a:t>
             </a:r>
           </a:p>
           <a:p>
             <a:pPr lvl="1"/>
             <a:r>
-              <a:rPr lang="en-US" smtClean="0"/>
+              <a:rPr lang="en-US"/>
               <a:t>Second level</a:t>
             </a:r>
           </a:p>
           <a:p>
             <a:pPr lvl="2"/>
             <a:r>
-              <a:rPr lang="en-US" smtClean="0"/>
+              <a:rPr lang="en-US"/>
               <a:t>Third level</a:t>
             </a:r>
           </a:p>
           <a:p>
             <a:pPr lvl="3"/>
             <a:r>
-              <a:rPr lang="en-US" smtClean="0"/>
+              <a:rPr lang="en-US"/>
               <a:t>Fourth level</a:t>
             </a:r>
           </a:p>
           <a:p>
             <a:pPr lvl="4"/>
             <a:r>
-              <a:rPr lang="en-US" smtClean="0"/>
+              <a:rPr lang="en-US"/>
               <a:t>Fifth level</a:t>
             </a:r>
-            <a:endParaRPr lang="en-US"/>
           </a:p>
         </p:txBody>
       </p:sp>
@@ -2252,7 +2250,7 @@
           <a:p>
             <a:pPr lvl="0"/>
             <a:r>
-              <a:rPr lang="en-US" smtClean="0"/>
+              <a:rPr lang="en-US"/>
               <a:t>Click to edit Master text styles</a:t>
             </a:r>
           </a:p>
@@ -2275,7 +2273,7 @@
           <a:p>
             <a:fld id="{5BCAD085-E8A6-8845-BD4E-CB4CCA059FC4}" type="datetimeFigureOut">
               <a:rPr lang="en-US" smtClean="0"/>
-              <a:t>1/27/13</a:t>
+              <a:t>1/20/26</a:t>
             </a:fld>
             <a:endParaRPr lang="en-US"/>
           </a:p>
@@ -2378,10 +2376,9 @@
           </a:lstStyle>
           <a:p>
             <a:r>
-              <a:rPr lang="en-US" smtClean="0"/>
+              <a:rPr lang="en-US"/>
               <a:t>Click to edit Master title style</a:t>
             </a:r>
-            <a:endParaRPr lang="en-US"/>
           </a:p>
         </p:txBody>
       </p:sp>
@@ -2505,7 +2502,7 @@
           <a:p>
             <a:pPr lvl="0"/>
             <a:r>
-              <a:rPr lang="en-US" smtClean="0"/>
+              <a:rPr lang="en-US"/>
               <a:t>Click to edit Master text styles</a:t>
             </a:r>
           </a:p>
@@ -2528,7 +2525,7 @@
           <a:p>
             <a:fld id="{5BCAD085-E8A6-8845-BD4E-CB4CCA059FC4}" type="datetimeFigureOut">
               <a:rPr lang="en-US" smtClean="0"/>
-              <a:t>1/27/13</a:t>
+              <a:t>1/20/26</a:t>
             </a:fld>
             <a:endParaRPr lang="en-US"/>
           </a:p>
@@ -2637,10 +2634,9 @@
           <a:lstStyle/>
           <a:p>
             <a:r>
-              <a:rPr lang="en-US" smtClean="0"/>
+              <a:rPr lang="en-US"/>
               <a:t>Click to edit Master title style</a:t>
             </a:r>
-            <a:endParaRPr lang="en-US"/>
           </a:p>
         </p:txBody>
       </p:sp>
@@ -2671,38 +2667,37 @@
           <a:p>
             <a:pPr lvl="0"/>
             <a:r>
-              <a:rPr lang="en-US" smtClean="0"/>
+              <a:rPr lang="en-US"/>
               <a:t>Click to edit Master text styles</a:t>
             </a:r>
           </a:p>
           <a:p>
             <a:pPr lvl="1"/>
             <a:r>
-              <a:rPr lang="en-US" smtClean="0"/>
+              <a:rPr lang="en-US"/>
               <a:t>Second level</a:t>
             </a:r>
           </a:p>
           <a:p>
             <a:pPr lvl="2"/>
             <a:r>
-              <a:rPr lang="en-US" smtClean="0"/>
+              <a:rPr lang="en-US"/>
               <a:t>Third level</a:t>
             </a:r>
           </a:p>
           <a:p>
             <a:pPr lvl="3"/>
             <a:r>
-              <a:rPr lang="en-US" smtClean="0"/>
+              <a:rPr lang="en-US"/>
               <a:t>Fourth level</a:t>
             </a:r>
           </a:p>
           <a:p>
             <a:pPr lvl="4"/>
             <a:r>
-              <a:rPr lang="en-US" smtClean="0"/>
+              <a:rPr lang="en-US"/>
               <a:t>Fifth level</a:t>
             </a:r>
-            <a:endParaRPr lang="en-US"/>
           </a:p>
         </p:txBody>
       </p:sp>
@@ -2741,7 +2736,7 @@
           <a:p>
             <a:fld id="{5BCAD085-E8A6-8845-BD4E-CB4CCA059FC4}" type="datetimeFigureOut">
               <a:rPr lang="en-US" smtClean="0"/>
-              <a:t>1/27/13</a:t>
+              <a:t>1/20/26</a:t>
             </a:fld>
             <a:endParaRPr lang="en-US"/>
           </a:p>
@@ -3100,7 +3095,7 @@
 </file>
 
 <file path=ppt/slides/slide1.xml><?xml version="1.0" encoding="utf-8"?>
-<p:sld xmlns:a="http://schemas.openxmlformats.org/drawingml/2006/main" xmlns:p="http://schemas.openxmlformats.org/presentationml/2006/main" xmlns:r="http://schemas.openxmlformats.org/officeDocument/2006/relationships">
+<p:sld xmlns:a="http://schemas.openxmlformats.org/drawingml/2006/main" xmlns:r="http://schemas.openxmlformats.org/officeDocument/2006/relationships" xmlns:p="http://schemas.openxmlformats.org/presentationml/2006/main">
   <p:cSld>
     <p:spTree>
       <p:nvGrpSpPr>
@@ -3108,7 +3103,14 @@
         <p:cNvGrpSpPr/>
         <p:nvPr/>
       </p:nvGrpSpPr>
-      <p:grpSpPr/>
+      <p:grpSpPr>
+        <a:xfrm>
+          <a:off x="0" y="0"/>
+          <a:ext cx="0" cy="0"/>
+          <a:chOff x="0" y="0"/>
+          <a:chExt cx="0" cy="0"/>
+        </a:xfrm>
+      </p:grpSpPr>
       <p:sp>
         <p:nvSpPr>
           <p:cNvPr id="2" name="Title 1"/>
@@ -3150,17 +3152,24 @@
             <p:ph type="subTitle" idx="1"/>
           </p:nvPr>
         </p:nvSpPr>
-        <p:spPr/>
-        <p:txBody>
-          <a:bodyPr/>
-          <a:lstStyle/>
-          <a:p>
-            <a:r>
+        <p:spPr>
+          <a:xfrm>
+            <a:off x="1371600" y="4354033"/>
+            <a:ext cx="6400800" cy="1752600"/>
+          </a:xfrm>
+        </p:spPr>
+        <p:txBody>
+          <a:bodyPr/>
+          <a:lstStyle/>
+          <a:p>
+            <a:r>
+              <a:rPr dirty="0"/>
               <a:t>Dialogue 2026</a:t>
             </a:r>
           </a:p>
           <a:p>
             <a:r>
+              <a:rPr dirty="0"/>
               <a:t>January 2026</a:t>
             </a:r>
           </a:p>
@@ -3175,7 +3184,7 @@
 </file>
 
 <file path=ppt/slides/slide10.xml><?xml version="1.0" encoding="utf-8"?>
-<p:sld xmlns:a="http://schemas.openxmlformats.org/drawingml/2006/main" xmlns:p="http://schemas.openxmlformats.org/presentationml/2006/main" xmlns:r="http://schemas.openxmlformats.org/officeDocument/2006/relationships">
+<p:sld xmlns:a="http://schemas.openxmlformats.org/drawingml/2006/main" xmlns:r="http://schemas.openxmlformats.org/officeDocument/2006/relationships" xmlns:p="http://schemas.openxmlformats.org/presentationml/2006/main">
   <p:cSld>
     <p:spTree>
       <p:nvGrpSpPr>
@@ -3183,7 +3192,14 @@
         <p:cNvGrpSpPr/>
         <p:nvPr/>
       </p:nvGrpSpPr>
-      <p:grpSpPr/>
+      <p:grpSpPr>
+        <a:xfrm>
+          <a:off x="0" y="0"/>
+          <a:ext cx="0" cy="0"/>
+          <a:chOff x="0" y="0"/>
+          <a:chExt cx="0" cy="0"/>
+        </a:xfrm>
+      </p:grpSpPr>
       <p:sp>
         <p:nvSpPr>
           <p:cNvPr id="2" name="Title 1"/>
@@ -3219,7 +3235,9 @@
         <p:txBody>
           <a:bodyPr/>
           <a:lstStyle/>
-          <a:p/>
+          <a:p>
+            <a:endParaRPr/>
+          </a:p>
           <a:p>
             <a:pPr>
               <a:defRPr sz="1800"/>
@@ -3232,6 +3250,7 @@
             <a:pPr>
               <a:defRPr sz="1800"/>
             </a:pPr>
+            <a:endParaRPr/>
           </a:p>
           <a:p>
             <a:pPr>
@@ -3269,6 +3288,7 @@
             <a:pPr>
               <a:defRPr sz="1800"/>
             </a:pPr>
+            <a:endParaRPr/>
           </a:p>
           <a:p>
             <a:pPr>
@@ -3305,7 +3325,7 @@
 </file>
 
 <file path=ppt/slides/slide11.xml><?xml version="1.0" encoding="utf-8"?>
-<p:sld xmlns:a="http://schemas.openxmlformats.org/drawingml/2006/main" xmlns:p="http://schemas.openxmlformats.org/presentationml/2006/main" xmlns:r="http://schemas.openxmlformats.org/officeDocument/2006/relationships">
+<p:sld xmlns:a="http://schemas.openxmlformats.org/drawingml/2006/main" xmlns:r="http://schemas.openxmlformats.org/officeDocument/2006/relationships" xmlns:p="http://schemas.openxmlformats.org/presentationml/2006/main">
   <p:cSld>
     <p:spTree>
       <p:nvGrpSpPr>
@@ -3313,7 +3333,14 @@
         <p:cNvGrpSpPr/>
         <p:nvPr/>
       </p:nvGrpSpPr>
-      <p:grpSpPr/>
+      <p:grpSpPr>
+        <a:xfrm>
+          <a:off x="0" y="0"/>
+          <a:ext cx="0" cy="0"/>
+          <a:chOff x="0" y="0"/>
+          <a:chExt cx="0" cy="0"/>
+        </a:xfrm>
+      </p:grpSpPr>
       <p:sp>
         <p:nvSpPr>
           <p:cNvPr id="2" name="Title 1"/>
@@ -3349,7 +3376,9 @@
         <p:txBody>
           <a:bodyPr/>
           <a:lstStyle/>
-          <a:p/>
+          <a:p>
+            <a:endParaRPr/>
+          </a:p>
           <a:p>
             <a:pPr>
               <a:defRPr sz="1800"/>
@@ -3362,6 +3391,7 @@
             <a:pPr>
               <a:defRPr sz="1800"/>
             </a:pPr>
+            <a:endParaRPr/>
           </a:p>
           <a:p>
             <a:pPr>
@@ -3391,6 +3421,7 @@
             <a:pPr>
               <a:defRPr sz="1800"/>
             </a:pPr>
+            <a:endParaRPr/>
           </a:p>
           <a:p>
             <a:pPr>
@@ -3419,7 +3450,7 @@
 </file>
 
 <file path=ppt/slides/slide12.xml><?xml version="1.0" encoding="utf-8"?>
-<p:sld xmlns:a="http://schemas.openxmlformats.org/drawingml/2006/main" xmlns:p="http://schemas.openxmlformats.org/presentationml/2006/main" xmlns:r="http://schemas.openxmlformats.org/officeDocument/2006/relationships">
+<p:sld xmlns:a="http://schemas.openxmlformats.org/drawingml/2006/main" xmlns:r="http://schemas.openxmlformats.org/officeDocument/2006/relationships" xmlns:p="http://schemas.openxmlformats.org/presentationml/2006/main">
   <p:cSld>
     <p:spTree>
       <p:nvGrpSpPr>
@@ -3427,7 +3458,14 @@
         <p:cNvGrpSpPr/>
         <p:nvPr/>
       </p:nvGrpSpPr>
-      <p:grpSpPr/>
+      <p:grpSpPr>
+        <a:xfrm>
+          <a:off x="0" y="0"/>
+          <a:ext cx="0" cy="0"/>
+          <a:chOff x="0" y="0"/>
+          <a:chExt cx="0" cy="0"/>
+        </a:xfrm>
+      </p:grpSpPr>
       <p:sp>
         <p:nvSpPr>
           <p:cNvPr id="2" name="Title 1"/>
@@ -3463,7 +3501,9 @@
         <p:txBody>
           <a:bodyPr/>
           <a:lstStyle/>
-          <a:p/>
+          <a:p>
+            <a:endParaRPr/>
+          </a:p>
           <a:p>
             <a:pPr>
               <a:defRPr sz="1800"/>
@@ -3476,6 +3516,7 @@
             <a:pPr>
               <a:defRPr sz="1800"/>
             </a:pPr>
+            <a:endParaRPr/>
           </a:p>
           <a:p>
             <a:pPr>
@@ -3513,6 +3554,7 @@
             <a:pPr>
               <a:defRPr sz="1800"/>
             </a:pPr>
+            <a:endParaRPr/>
           </a:p>
           <a:p>
             <a:pPr>
@@ -3533,7 +3575,7 @@
 </file>
 
 <file path=ppt/slides/slide13.xml><?xml version="1.0" encoding="utf-8"?>
-<p:sld xmlns:a="http://schemas.openxmlformats.org/drawingml/2006/main" xmlns:p="http://schemas.openxmlformats.org/presentationml/2006/main" xmlns:r="http://schemas.openxmlformats.org/officeDocument/2006/relationships">
+<p:sld xmlns:a="http://schemas.openxmlformats.org/drawingml/2006/main" xmlns:r="http://schemas.openxmlformats.org/officeDocument/2006/relationships" xmlns:p="http://schemas.openxmlformats.org/presentationml/2006/main">
   <p:cSld>
     <p:spTree>
       <p:nvGrpSpPr>
@@ -3541,7 +3583,14 @@
         <p:cNvGrpSpPr/>
         <p:nvPr/>
       </p:nvGrpSpPr>
-      <p:grpSpPr/>
+      <p:grpSpPr>
+        <a:xfrm>
+          <a:off x="0" y="0"/>
+          <a:ext cx="0" cy="0"/>
+          <a:chOff x="0" y="0"/>
+          <a:chExt cx="0" cy="0"/>
+        </a:xfrm>
+      </p:grpSpPr>
       <p:sp>
         <p:nvSpPr>
           <p:cNvPr id="2" name="Title 1"/>
@@ -3571,7 +3620,7 @@
         </p:nvSpPr>
         <p:spPr>
           <a:xfrm>
-            <a:off x="457200" y="1371600"/>
+            <a:off x="457200" y="1658679"/>
             <a:ext cx="3657600" cy="4572000"/>
           </a:xfrm>
           <a:prstGeom prst="rect">
@@ -3586,9 +3635,10 @@
           <a:lstStyle/>
           <a:p>
             <a:pPr>
-              <a:defRPr b="1" sz="1600"/>
-            </a:pPr>
-            <a:r>
+              <a:defRPr sz="1600" b="1"/>
+            </a:pPr>
+            <a:r>
+              <a:rPr dirty="0"/>
               <a:t>All three wrong</a:t>
             </a:r>
           </a:p>
@@ -3597,6 +3647,7 @@
               <a:defRPr sz="1400"/>
             </a:pPr>
             <a:r>
+              <a:rPr dirty="0"/>
               <a:t>105 articles (2.1%)</a:t>
             </a:r>
           </a:p>
@@ -3605,6 +3656,7 @@
               <a:defRPr sz="1400"/>
             </a:pPr>
             <a:r>
+              <a:rPr dirty="0"/>
               <a:t>Genuinely ambiguous</a:t>
             </a:r>
           </a:p>
@@ -3613,6 +3665,7 @@
               <a:defRPr sz="1400"/>
             </a:pPr>
             <a:r>
+              <a:rPr dirty="0"/>
               <a:t>No clear classification</a:t>
             </a:r>
           </a:p>
@@ -3626,7 +3679,7 @@
         </p:nvSpPr>
         <p:spPr>
           <a:xfrm>
-            <a:off x="4572000" y="1371600"/>
+            <a:off x="4572000" y="1715350"/>
             <a:ext cx="4114800" cy="4572000"/>
           </a:xfrm>
           <a:prstGeom prst="rect">
@@ -3641,9 +3694,10 @@
           <a:lstStyle/>
           <a:p>
             <a:pPr>
-              <a:defRPr b="1" sz="1600"/>
-            </a:pPr>
-            <a:r>
+              <a:defRPr sz="1600" b="1"/>
+            </a:pPr>
+            <a:r>
+              <a:rPr dirty="0"/>
               <a:t>Model disagreement</a:t>
             </a:r>
           </a:p>
@@ -3652,6 +3706,7 @@
               <a:defRPr sz="1400"/>
             </a:pPr>
             <a:r>
+              <a:rPr dirty="0"/>
               <a:t>1,390 articles (27.8%)</a:t>
             </a:r>
           </a:p>
@@ -3660,6 +3715,7 @@
               <a:defRPr sz="1400"/>
             </a:pPr>
             <a:r>
+              <a:rPr dirty="0"/>
               <a:t>Boundary cases</a:t>
             </a:r>
           </a:p>
@@ -3668,6 +3724,7 @@
               <a:defRPr sz="1400"/>
             </a:pPr>
             <a:r>
+              <a:rPr dirty="0"/>
               <a:t>Linguistic overlap</a:t>
             </a:r>
           </a:p>
@@ -3682,7 +3739,7 @@
 </file>
 
 <file path=ppt/slides/slide14.xml><?xml version="1.0" encoding="utf-8"?>
-<p:sld xmlns:a="http://schemas.openxmlformats.org/drawingml/2006/main" xmlns:p="http://schemas.openxmlformats.org/presentationml/2006/main" xmlns:r="http://schemas.openxmlformats.org/officeDocument/2006/relationships">
+<p:sld xmlns:a="http://schemas.openxmlformats.org/drawingml/2006/main" xmlns:r="http://schemas.openxmlformats.org/officeDocument/2006/relationships" xmlns:p="http://schemas.openxmlformats.org/presentationml/2006/main">
   <p:cSld>
     <p:spTree>
       <p:nvGrpSpPr>
@@ -3690,7 +3747,14 @@
         <p:cNvGrpSpPr/>
         <p:nvPr/>
       </p:nvGrpSpPr>
-      <p:grpSpPr/>
+      <p:grpSpPr>
+        <a:xfrm>
+          <a:off x="0" y="0"/>
+          <a:ext cx="0" cy="0"/>
+          <a:chOff x="0" y="0"/>
+          <a:chExt cx="0" cy="0"/>
+        </a:xfrm>
+      </p:grpSpPr>
       <p:sp>
         <p:nvSpPr>
           <p:cNvPr id="2" name="Title 1"/>
@@ -3726,7 +3790,9 @@
         <p:txBody>
           <a:bodyPr/>
           <a:lstStyle/>
-          <a:p/>
+          <a:p>
+            <a:endParaRPr/>
+          </a:p>
           <a:p>
             <a:pPr>
               <a:defRPr sz="1800"/>
@@ -3747,6 +3813,7 @@
             <a:pPr>
               <a:defRPr sz="1800"/>
             </a:pPr>
+            <a:endParaRPr/>
           </a:p>
           <a:p>
             <a:pPr>
@@ -3767,7 +3834,7 @@
 </file>
 
 <file path=ppt/slides/slide15.xml><?xml version="1.0" encoding="utf-8"?>
-<p:sld xmlns:a="http://schemas.openxmlformats.org/drawingml/2006/main" xmlns:p="http://schemas.openxmlformats.org/presentationml/2006/main" xmlns:r="http://schemas.openxmlformats.org/officeDocument/2006/relationships">
+<p:sld xmlns:a="http://schemas.openxmlformats.org/drawingml/2006/main" xmlns:r="http://schemas.openxmlformats.org/officeDocument/2006/relationships" xmlns:p="http://schemas.openxmlformats.org/presentationml/2006/main">
   <p:cSld>
     <p:spTree>
       <p:nvGrpSpPr>
@@ -3775,7 +3842,14 @@
         <p:cNvGrpSpPr/>
         <p:nvPr/>
       </p:nvGrpSpPr>
-      <p:grpSpPr/>
+      <p:grpSpPr>
+        <a:xfrm>
+          <a:off x="0" y="0"/>
+          <a:ext cx="0" cy="0"/>
+          <a:chOff x="0" y="0"/>
+          <a:chExt cx="0" cy="0"/>
+        </a:xfrm>
+      </p:grpSpPr>
       <p:sp>
         <p:nvSpPr>
           <p:cNvPr id="2" name="Title 1"/>
@@ -3793,6 +3867,667 @@
           <a:p>
             <a:r>
               <a:t>Genre-Specific Attention Markers</a:t>
+            </a:r>
+          </a:p>
+        </p:txBody>
+      </p:sp>
+      <p:graphicFrame>
+        <p:nvGraphicFramePr>
+          <p:cNvPr id="3" name="Table 2"/>
+          <p:cNvGraphicFramePr>
+            <a:graphicFrameLocks noGrp="1"/>
+          </p:cNvGraphicFramePr>
+          <p:nvPr/>
+        </p:nvGraphicFramePr>
+        <p:xfrm>
+          <a:off x="457200" y="1371600"/>
+          <a:ext cx="8229600" cy="1676400"/>
+        </p:xfrm>
+        <a:graphic>
+          <a:graphicData uri="http://schemas.openxmlformats.org/drawingml/2006/table">
+            <a:tbl>
+              <a:tblPr firstRow="1" bandRow="1">
+                <a:tableStyleId>{5C22544A-7EE6-4342-B048-85BDC9FD1C3A}</a:tableStyleId>
+              </a:tblPr>
+              <a:tblGrid>
+                <a:gridCol w="2743200">
+                  <a:extLst>
+                    <a:ext uri="{9D8B030D-6E8A-4147-A177-3AD203B41FA5}">
+                      <a16:colId xmlns:a16="http://schemas.microsoft.com/office/drawing/2014/main" val="20000"/>
+                    </a:ext>
+                  </a:extLst>
+                </a:gridCol>
+                <a:gridCol w="2743200">
+                  <a:extLst>
+                    <a:ext uri="{9D8B030D-6E8A-4147-A177-3AD203B41FA5}">
+                      <a16:colId xmlns:a16="http://schemas.microsoft.com/office/drawing/2014/main" val="20001"/>
+                    </a:ext>
+                  </a:extLst>
+                </a:gridCol>
+                <a:gridCol w="2743200">
+                  <a:extLst>
+                    <a:ext uri="{9D8B030D-6E8A-4147-A177-3AD203B41FA5}">
+                      <a16:colId xmlns:a16="http://schemas.microsoft.com/office/drawing/2014/main" val="20002"/>
+                    </a:ext>
+                  </a:extLst>
+                </a:gridCol>
+              </a:tblGrid>
+              <a:tr h="121920">
+                <a:tc>
+                  <a:txBody>
+                    <a:bodyPr/>
+                    <a:lstStyle/>
+                    <a:p>
+                      <a:pPr>
+                        <a:defRPr sz="1400" b="1"/>
+                      </a:pPr>
+                      <a:r>
+                        <a:t>Genre</a:t>
+                      </a:r>
+                    </a:p>
+                  </a:txBody>
+                  <a:tcPr/>
+                </a:tc>
+                <a:tc>
+                  <a:txBody>
+                    <a:bodyPr/>
+                    <a:lstStyle/>
+                    <a:p>
+                      <a:pPr>
+                        <a:defRPr sz="1400" b="1"/>
+                      </a:pPr>
+                      <a:r>
+                        <a:t>Top-3 Tokens</a:t>
+                      </a:r>
+                    </a:p>
+                  </a:txBody>
+                  <a:tcPr/>
+                </a:tc>
+                <a:tc>
+                  <a:txBody>
+                    <a:bodyPr/>
+                    <a:lstStyle/>
+                    <a:p>
+                      <a:pPr>
+                        <a:defRPr sz="1400" b="1"/>
+                      </a:pPr>
+                      <a:r>
+                        <a:t>Interpretation</a:t>
+                      </a:r>
+                    </a:p>
+                  </a:txBody>
+                  <a:tcPr/>
+                </a:tc>
+                <a:extLst>
+                  <a:ext uri="{0D108BD9-81ED-4DB2-BD59-A6C34878D82A}">
+                    <a16:rowId xmlns:a16="http://schemas.microsoft.com/office/drawing/2014/main" val="10000"/>
+                  </a:ext>
+                </a:extLst>
+              </a:tr>
+              <a:tr h="121920">
+                <a:tc>
+                  <a:txBody>
+                    <a:bodyPr/>
+                    <a:lstStyle/>
+                    <a:p>
+                      <a:pPr>
+                        <a:defRPr sz="1200"/>
+                      </a:pPr>
+                      <a:r>
+                        <a:t>Analytical</a:t>
+                      </a:r>
+                    </a:p>
+                  </a:txBody>
+                  <a:tcPr/>
+                </a:tc>
+                <a:tc>
+                  <a:txBody>
+                    <a:bodyPr/>
+                    <a:lstStyle/>
+                    <a:p>
+                      <a:pPr>
+                        <a:defRPr sz="1200"/>
+                      </a:pPr>
+                      <a:r>
+                        <a:t>boris, johnson, downing</a:t>
+                      </a:r>
+                    </a:p>
+                  </a:txBody>
+                  <a:tcPr/>
+                </a:tc>
+                <a:tc>
+                  <a:txBody>
+                    <a:bodyPr/>
+                    <a:lstStyle/>
+                    <a:p>
+                      <a:pPr>
+                        <a:defRPr sz="1200"/>
+                      </a:pPr>
+                      <a:r>
+                        <a:t>Politics, names</a:t>
+                      </a:r>
+                    </a:p>
+                  </a:txBody>
+                  <a:tcPr/>
+                </a:tc>
+                <a:extLst>
+                  <a:ext uri="{0D108BD9-81ED-4DB2-BD59-A6C34878D82A}">
+                    <a16:rowId xmlns:a16="http://schemas.microsoft.com/office/drawing/2014/main" val="10001"/>
+                  </a:ext>
+                </a:extLst>
+              </a:tr>
+              <a:tr h="121920">
+                <a:tc>
+                  <a:txBody>
+                    <a:bodyPr/>
+                    <a:lstStyle/>
+                    <a:p>
+                      <a:pPr>
+                        <a:defRPr sz="1200"/>
+                      </a:pPr>
+                      <a:r>
+                        <a:t>Editorial</a:t>
+                      </a:r>
+                    </a:p>
+                  </a:txBody>
+                  <a:tcPr/>
+                </a:tc>
+                <a:tc>
+                  <a:txBody>
+                    <a:bodyPr/>
+                    <a:lstStyle/>
+                    <a:p>
+                      <a:pPr>
+                        <a:defRPr sz="1200"/>
+                      </a:pPr>
+                      <a:r>
+                        <a:t>mr, nhs, of</a:t>
+                      </a:r>
+                    </a:p>
+                  </a:txBody>
+                  <a:tcPr/>
+                </a:tc>
+                <a:tc>
+                  <a:txBody>
+                    <a:bodyPr/>
+                    <a:lstStyle/>
+                    <a:p>
+                      <a:pPr>
+                        <a:defRPr sz="1200"/>
+                      </a:pPr>
+                      <a:r>
+                        <a:t>Institutions</a:t>
+                      </a:r>
+                    </a:p>
+                  </a:txBody>
+                  <a:tcPr/>
+                </a:tc>
+                <a:extLst>
+                  <a:ext uri="{0D108BD9-81ED-4DB2-BD59-A6C34878D82A}">
+                    <a16:rowId xmlns:a16="http://schemas.microsoft.com/office/drawing/2014/main" val="10002"/>
+                  </a:ext>
+                </a:extLst>
+              </a:tr>
+              <a:tr h="121920">
+                <a:tc>
+                  <a:txBody>
+                    <a:bodyPr/>
+                    <a:lstStyle/>
+                    <a:p>
+                      <a:pPr>
+                        <a:defRPr sz="1200"/>
+                      </a:pPr>
+                      <a:r>
+                        <a:t>Feature</a:t>
+                      </a:r>
+                    </a:p>
+                  </a:txBody>
+                  <a:tcPr/>
+                </a:tc>
+                <a:tc>
+                  <a:txBody>
+                    <a:bodyPr/>
+                    <a:lstStyle/>
+                    <a:p>
+                      <a:pPr>
+                        <a:defRPr sz="1200"/>
+                      </a:pPr>
+                      <a:r>
+                        <a:t>i, my, said</a:t>
+                      </a:r>
+                    </a:p>
+                  </a:txBody>
+                  <a:tcPr/>
+                </a:tc>
+                <a:tc>
+                  <a:txBody>
+                    <a:bodyPr/>
+                    <a:lstStyle/>
+                    <a:p>
+                      <a:pPr>
+                        <a:defRPr sz="1200"/>
+                      </a:pPr>
+                      <a:r>
+                        <a:t>Narrative, personal</a:t>
+                      </a:r>
+                    </a:p>
+                  </a:txBody>
+                  <a:tcPr/>
+                </a:tc>
+                <a:extLst>
+                  <a:ext uri="{0D108BD9-81ED-4DB2-BD59-A6C34878D82A}">
+                    <a16:rowId xmlns:a16="http://schemas.microsoft.com/office/drawing/2014/main" val="10003"/>
+                  </a:ext>
+                </a:extLst>
+              </a:tr>
+              <a:tr h="121920">
+                <a:tc>
+                  <a:txBody>
+                    <a:bodyPr/>
+                    <a:lstStyle/>
+                    <a:p>
+                      <a:pPr>
+                        <a:defRPr sz="1200"/>
+                      </a:pPr>
+                      <a:r>
+                        <a:t>News</a:t>
+                      </a:r>
+                    </a:p>
+                  </a:txBody>
+                  <a:tcPr/>
+                </a:tc>
+                <a:tc>
+                  <a:txBody>
+                    <a:bodyPr/>
+                    <a:lstStyle/>
+                    <a:p>
+                      <a:pPr>
+                        <a:defRPr sz="1200"/>
+                      </a:pPr>
+                      <a:r>
+                        <a:t>trump, masters, after</a:t>
+                      </a:r>
+                    </a:p>
+                  </a:txBody>
+                  <a:tcPr/>
+                </a:tc>
+                <a:tc>
+                  <a:txBody>
+                    <a:bodyPr/>
+                    <a:lstStyle/>
+                    <a:p>
+                      <a:pPr>
+                        <a:defRPr sz="1200"/>
+                      </a:pPr>
+                      <a:r>
+                        <a:t>Events, facts</a:t>
+                      </a:r>
+                    </a:p>
+                  </a:txBody>
+                  <a:tcPr/>
+                </a:tc>
+                <a:extLst>
+                  <a:ext uri="{0D108BD9-81ED-4DB2-BD59-A6C34878D82A}">
+                    <a16:rowId xmlns:a16="http://schemas.microsoft.com/office/drawing/2014/main" val="10004"/>
+                  </a:ext>
+                </a:extLst>
+              </a:tr>
+              <a:tr h="121920">
+                <a:tc>
+                  <a:txBody>
+                    <a:bodyPr/>
+                    <a:lstStyle/>
+                    <a:p>
+                      <a:pPr>
+                        <a:defRPr sz="1200"/>
+                      </a:pPr>
+                      <a:r>
+                        <a:t>Review</a:t>
+                      </a:r>
+                    </a:p>
+                  </a:txBody>
+                  <a:tcPr/>
+                </a:tc>
+                <a:tc>
+                  <a:txBody>
+                    <a:bodyPr/>
+                    <a:lstStyle/>
+                    <a:p>
+                      <a:pPr>
+                        <a:defRPr sz="1200"/>
+                      </a:pPr>
+                      <a:r>
+                        <a:t>staging, debut, opera</a:t>
+                      </a:r>
+                    </a:p>
+                  </a:txBody>
+                  <a:tcPr/>
+                </a:tc>
+                <a:tc>
+                  <a:txBody>
+                    <a:bodyPr/>
+                    <a:lstStyle/>
+                    <a:p>
+                      <a:pPr>
+                        <a:defRPr sz="1200"/>
+                      </a:pPr>
+                      <a:r>
+                        <a:t>Culture, arts</a:t>
+                      </a:r>
+                    </a:p>
+                  </a:txBody>
+                  <a:tcPr/>
+                </a:tc>
+                <a:extLst>
+                  <a:ext uri="{0D108BD9-81ED-4DB2-BD59-A6C34878D82A}">
+                    <a16:rowId xmlns:a16="http://schemas.microsoft.com/office/drawing/2014/main" val="10005"/>
+                  </a:ext>
+                </a:extLst>
+              </a:tr>
+            </a:tbl>
+          </a:graphicData>
+        </a:graphic>
+      </p:graphicFrame>
+    </p:spTree>
+  </p:cSld>
+  <p:clrMapOvr>
+    <a:masterClrMapping/>
+  </p:clrMapOvr>
+</p:sld>
+</file>
+
+<file path=ppt/slides/slide16.xml><?xml version="1.0" encoding="utf-8"?>
+<p:sld xmlns:a="http://schemas.openxmlformats.org/drawingml/2006/main" xmlns:r="http://schemas.openxmlformats.org/officeDocument/2006/relationships" xmlns:p="http://schemas.openxmlformats.org/presentationml/2006/main">
+  <p:cSld>
+    <p:spTree>
+      <p:nvGrpSpPr>
+        <p:cNvPr id="1" name=""/>
+        <p:cNvGrpSpPr/>
+        <p:nvPr/>
+      </p:nvGrpSpPr>
+      <p:grpSpPr>
+        <a:xfrm>
+          <a:off x="0" y="0"/>
+          <a:ext cx="0" cy="0"/>
+          <a:chOff x="0" y="0"/>
+          <a:chExt cx="0" cy="0"/>
+        </a:xfrm>
+      </p:grpSpPr>
+      <p:sp>
+        <p:nvSpPr>
+          <p:cNvPr id="2" name="Title 1"/>
+          <p:cNvSpPr>
+            <a:spLocks noGrp="1"/>
+          </p:cNvSpPr>
+          <p:nvPr>
+            <p:ph type="title"/>
+          </p:nvPr>
+        </p:nvSpPr>
+        <p:spPr/>
+        <p:txBody>
+          <a:bodyPr/>
+          <a:lstStyle/>
+          <a:p>
+            <a:r>
+              <a:t>Universal Markers Across All Genres</a:t>
+            </a:r>
+          </a:p>
+        </p:txBody>
+      </p:sp>
+      <p:sp>
+        <p:nvSpPr>
+          <p:cNvPr id="3" name="Content Placeholder 2"/>
+          <p:cNvSpPr>
+            <a:spLocks noGrp="1"/>
+          </p:cNvSpPr>
+          <p:nvPr>
+            <p:ph idx="1"/>
+          </p:nvPr>
+        </p:nvSpPr>
+        <p:spPr/>
+        <p:txBody>
+          <a:bodyPr/>
+          <a:lstStyle/>
+          <a:p>
+            <a:endParaRPr/>
+          </a:p>
+          <a:p>
+            <a:pPr>
+              <a:defRPr sz="1800"/>
+            </a:pPr>
+            <a:r>
+              <a:t>Common high-attention tokens:</a:t>
+            </a:r>
+          </a:p>
+          <a:p>
+            <a:pPr>
+              <a:defRPr sz="1800"/>
+            </a:pPr>
+            <a:r>
+              <a:t>• 'we', 'related', 'sp' (function words)</a:t>
+            </a:r>
+          </a:p>
+          <a:p>
+            <a:pPr>
+              <a:defRPr sz="1800"/>
+            </a:pPr>
+            <a:endParaRPr/>
+          </a:p>
+          <a:p>
+            <a:pPr>
+              <a:defRPr sz="1800"/>
+            </a:pPr>
+            <a:r>
+              <a:t>Key insight:</a:t>
+            </a:r>
+          </a:p>
+          <a:p>
+            <a:pPr>
+              <a:defRPr sz="1800"/>
+            </a:pPr>
+            <a:r>
+              <a:t>→ No unique vocabulary for any genre</a:t>
+            </a:r>
+          </a:p>
+          <a:p>
+            <a:pPr>
+              <a:defRPr sz="1800"/>
+            </a:pPr>
+            <a:r>
+              <a:t>→ Overlapping token distributions</a:t>
+            </a:r>
+          </a:p>
+          <a:p>
+            <a:pPr>
+              <a:defRPr sz="1800"/>
+            </a:pPr>
+            <a:r>
+              <a:t>→ Explains gradient boundaries</a:t>
+            </a:r>
+          </a:p>
+          <a:p>
+            <a:pPr>
+              <a:defRPr sz="1800"/>
+            </a:pPr>
+            <a:endParaRPr/>
+          </a:p>
+          <a:p>
+            <a:pPr>
+              <a:defRPr sz="1800"/>
+            </a:pPr>
+            <a:r>
+              <a:t>Genres blend into each other; boundaries are permeable</a:t>
+            </a:r>
+          </a:p>
+        </p:txBody>
+      </p:sp>
+    </p:spTree>
+  </p:cSld>
+  <p:clrMapOvr>
+    <a:masterClrMapping/>
+  </p:clrMapOvr>
+</p:sld>
+</file>
+
+<file path=ppt/slides/slide17.xml><?xml version="1.0" encoding="utf-8"?>
+<p:sld xmlns:a="http://schemas.openxmlformats.org/drawingml/2006/main" xmlns:r="http://schemas.openxmlformats.org/officeDocument/2006/relationships" xmlns:p="http://schemas.openxmlformats.org/presentationml/2006/main">
+  <p:cSld>
+    <p:spTree>
+      <p:nvGrpSpPr>
+        <p:cNvPr id="1" name=""/>
+        <p:cNvGrpSpPr/>
+        <p:nvPr/>
+      </p:nvGrpSpPr>
+      <p:grpSpPr>
+        <a:xfrm>
+          <a:off x="0" y="0"/>
+          <a:ext cx="0" cy="0"/>
+          <a:chOff x="0" y="0"/>
+          <a:chExt cx="0" cy="0"/>
+        </a:xfrm>
+      </p:grpSpPr>
+      <p:sp>
+        <p:nvSpPr>
+          <p:cNvPr id="2" name="Title 1"/>
+          <p:cNvSpPr>
+            <a:spLocks noGrp="1"/>
+          </p:cNvSpPr>
+          <p:nvPr>
+            <p:ph type="title"/>
+          </p:nvPr>
+        </p:nvSpPr>
+        <p:spPr/>
+        <p:txBody>
+          <a:bodyPr/>
+          <a:lstStyle/>
+          <a:p>
+            <a:r>
+              <a:t>Theoretical Implications</a:t>
+            </a:r>
+          </a:p>
+        </p:txBody>
+      </p:sp>
+      <p:sp>
+        <p:nvSpPr>
+          <p:cNvPr id="3" name="Content Placeholder 2"/>
+          <p:cNvSpPr>
+            <a:spLocks noGrp="1"/>
+          </p:cNvSpPr>
+          <p:nvPr>
+            <p:ph idx="1"/>
+          </p:nvPr>
+        </p:nvSpPr>
+        <p:spPr/>
+        <p:txBody>
+          <a:bodyPr/>
+          <a:lstStyle/>
+          <a:p>
+            <a:endParaRPr/>
+          </a:p>
+          <a:p>
+            <a:pPr>
+              <a:defRPr sz="1800"/>
+            </a:pPr>
+            <a:r>
+              <a:t>1. Genre as gradient, not discrete</a:t>
+            </a:r>
+          </a:p>
+          <a:p>
+            <a:pPr>
+              <a:defRPr sz="1800"/>
+            </a:pPr>
+            <a:r>
+              <a:t>   → Empirical evidence from model disagreement</a:t>
+            </a:r>
+          </a:p>
+          <a:p>
+            <a:pPr>
+              <a:defRPr sz="1800"/>
+            </a:pPr>
+            <a:endParaRPr/>
+          </a:p>
+          <a:p>
+            <a:pPr>
+              <a:defRPr sz="1800"/>
+            </a:pPr>
+            <a:r>
+              <a:t>2. Lexical primacy in genre classification</a:t>
+            </a:r>
+          </a:p>
+          <a:p>
+            <a:pPr>
+              <a:defRPr sz="1800"/>
+            </a:pPr>
+            <a:r>
+              <a:t>   → Word choice outweighs syntax and context</a:t>
+            </a:r>
+          </a:p>
+          <a:p>
+            <a:pPr>
+              <a:defRPr sz="1800"/>
+            </a:pPr>
+            <a:endParaRPr/>
+          </a:p>
+          <a:p>
+            <a:pPr>
+              <a:defRPr sz="1800"/>
+            </a:pPr>
+            <a:r>
+              <a:t>3. Model disagreement as uncertainty metric</a:t>
+            </a:r>
+          </a:p>
+          <a:p>
+            <a:pPr>
+              <a:defRPr sz="1800"/>
+            </a:pPr>
+            <a:r>
+              <a:t>   → Flagging ambiguous cases for human review</a:t>
+            </a:r>
+          </a:p>
+        </p:txBody>
+      </p:sp>
+    </p:spTree>
+  </p:cSld>
+  <p:clrMapOvr>
+    <a:masterClrMapping/>
+  </p:clrMapOvr>
+</p:sld>
+</file>
+
+<file path=ppt/slides/slide18.xml><?xml version="1.0" encoding="utf-8"?>
+<p:sld xmlns:a="http://schemas.openxmlformats.org/drawingml/2006/main" xmlns:r="http://schemas.openxmlformats.org/officeDocument/2006/relationships" xmlns:p="http://schemas.openxmlformats.org/presentationml/2006/main">
+  <p:cSld>
+    <p:spTree>
+      <p:nvGrpSpPr>
+        <p:cNvPr id="1" name=""/>
+        <p:cNvGrpSpPr/>
+        <p:nvPr/>
+      </p:nvGrpSpPr>
+      <p:grpSpPr>
+        <a:xfrm>
+          <a:off x="0" y="0"/>
+          <a:ext cx="0" cy="0"/>
+          <a:chOff x="0" y="0"/>
+          <a:chExt cx="0" cy="0"/>
+        </a:xfrm>
+      </p:grpSpPr>
+      <p:sp>
+        <p:nvSpPr>
+          <p:cNvPr id="2" name="Title 1"/>
+          <p:cNvSpPr>
+            <a:spLocks noGrp="1"/>
+          </p:cNvSpPr>
+          <p:nvPr>
+            <p:ph type="title"/>
+          </p:nvPr>
+        </p:nvSpPr>
+        <p:spPr/>
+        <p:txBody>
+          <a:bodyPr/>
+          <a:lstStyle/>
+          <a:p>
+            <a:r>
+              <a:t>Final Model Rankings</a:t>
             </a:r>
           </a:p>
         </p:txBody>
@@ -3816,58 +4551,103 @@
                 <a:tableStyleId>{5C22544A-7EE6-4342-B048-85BDC9FD1C3A}</a:tableStyleId>
               </a:tblPr>
               <a:tblGrid>
-                <a:gridCol w="2743200"/>
-                <a:gridCol w="2743200"/>
-                <a:gridCol w="2743200"/>
+                <a:gridCol w="2057400">
+                  <a:extLst>
+                    <a:ext uri="{9D8B030D-6E8A-4147-A177-3AD203B41FA5}">
+                      <a16:colId xmlns:a16="http://schemas.microsoft.com/office/drawing/2014/main" val="20000"/>
+                    </a:ext>
+                  </a:extLst>
+                </a:gridCol>
+                <a:gridCol w="2057400">
+                  <a:extLst>
+                    <a:ext uri="{9D8B030D-6E8A-4147-A177-3AD203B41FA5}">
+                      <a16:colId xmlns:a16="http://schemas.microsoft.com/office/drawing/2014/main" val="20001"/>
+                    </a:ext>
+                  </a:extLst>
+                </a:gridCol>
+                <a:gridCol w="2057400">
+                  <a:extLst>
+                    <a:ext uri="{9D8B030D-6E8A-4147-A177-3AD203B41FA5}">
+                      <a16:colId xmlns:a16="http://schemas.microsoft.com/office/drawing/2014/main" val="20002"/>
+                    </a:ext>
+                  </a:extLst>
+                </a:gridCol>
+                <a:gridCol w="2057400">
+                  <a:extLst>
+                    <a:ext uri="{9D8B030D-6E8A-4147-A177-3AD203B41FA5}">
+                      <a16:colId xmlns:a16="http://schemas.microsoft.com/office/drawing/2014/main" val="20003"/>
+                    </a:ext>
+                  </a:extLst>
+                </a:gridCol>
               </a:tblGrid>
-              <a:tr h="121920">
-                <a:tc>
-                  <a:txBody>
-                    <a:bodyPr/>
-                    <a:lstStyle/>
-                    <a:p>
-                      <a:pPr>
-                        <a:defRPr b="1" sz="1400"/>
-                      </a:pPr>
-                      <a:r>
-                        <a:t>Genre</a:t>
-                      </a:r>
-                    </a:p>
-                  </a:txBody>
-                  <a:tcPr/>
-                </a:tc>
-                <a:tc>
-                  <a:txBody>
-                    <a:bodyPr/>
-                    <a:lstStyle/>
-                    <a:p>
-                      <a:pPr>
-                        <a:defRPr b="1" sz="1400"/>
-                      </a:pPr>
-                      <a:r>
-                        <a:t>Top-3 Tokens</a:t>
-                      </a:r>
-                    </a:p>
-                  </a:txBody>
-                  <a:tcPr/>
-                </a:tc>
-                <a:tc>
-                  <a:txBody>
-                    <a:bodyPr/>
-                    <a:lstStyle/>
-                    <a:p>
-                      <a:pPr>
-                        <a:defRPr b="1" sz="1400"/>
-                      </a:pPr>
-                      <a:r>
-                        <a:t>Interpretation</a:t>
-                      </a:r>
-                    </a:p>
-                  </a:txBody>
-                  <a:tcPr/>
-                </a:tc>
+              <a:tr h="182880">
+                <a:tc>
+                  <a:txBody>
+                    <a:bodyPr/>
+                    <a:lstStyle/>
+                    <a:p>
+                      <a:pPr>
+                        <a:defRPr sz="1400" b="1"/>
+                      </a:pPr>
+                      <a:r>
+                        <a:t>Rank</a:t>
+                      </a:r>
+                    </a:p>
+                  </a:txBody>
+                  <a:tcPr/>
+                </a:tc>
+                <a:tc>
+                  <a:txBody>
+                    <a:bodyPr/>
+                    <a:lstStyle/>
+                    <a:p>
+                      <a:pPr>
+                        <a:defRPr sz="1400" b="1"/>
+                      </a:pPr>
+                      <a:r>
+                        <a:t>Model</a:t>
+                      </a:r>
+                    </a:p>
+                  </a:txBody>
+                  <a:tcPr/>
+                </a:tc>
+                <a:tc>
+                  <a:txBody>
+                    <a:bodyPr/>
+                    <a:lstStyle/>
+                    <a:p>
+                      <a:pPr>
+                        <a:defRPr sz="1400" b="1"/>
+                      </a:pPr>
+                      <a:r>
+                        <a:t>Accuracy</a:t>
+                      </a:r>
+                    </a:p>
+                  </a:txBody>
+                  <a:tcPr/>
+                </a:tc>
+                <a:tc>
+                  <a:txBody>
+                    <a:bodyPr/>
+                    <a:lstStyle/>
+                    <a:p>
+                      <a:pPr>
+                        <a:defRPr sz="1400" b="1"/>
+                      </a:pPr>
+                      <a:r>
+                        <a:t>Level</a:t>
+                      </a:r>
+                    </a:p>
+                  </a:txBody>
+                  <a:tcPr/>
+                </a:tc>
+                <a:extLst>
+                  <a:ext uri="{0D108BD9-81ED-4DB2-BD59-A6C34878D82A}">
+                    <a16:rowId xmlns:a16="http://schemas.microsoft.com/office/drawing/2014/main" val="10000"/>
+                  </a:ext>
+                </a:extLst>
               </a:tr>
-              <a:tr h="121920">
+              <a:tr h="182880">
                 <a:tc>
                   <a:txBody>
                     <a:bodyPr/>
@@ -3877,7 +4657,7 @@
                         <a:defRPr sz="1200"/>
                       </a:pPr>
                       <a:r>
-                        <a:t>Analytical</a:t>
+                        <a:t>🥇 1st</a:t>
                       </a:r>
                     </a:p>
                   </a:txBody>
@@ -3892,7 +4672,7 @@
                         <a:defRPr sz="1200"/>
                       </a:pPr>
                       <a:r>
-                        <a:t>boris, johnson, downing</a:t>
+                        <a:t>BERT</a:t>
                       </a:r>
                     </a:p>
                   </a:txBody>
@@ -3907,14 +4687,34 @@
                         <a:defRPr sz="1200"/>
                       </a:pPr>
                       <a:r>
-                        <a:t>Politics, names</a:t>
-                      </a:r>
-                    </a:p>
-                  </a:txBody>
-                  <a:tcPr/>
-                </a:tc>
+                        <a:t>87.64%</a:t>
+                      </a:r>
+                    </a:p>
+                  </a:txBody>
+                  <a:tcPr/>
+                </a:tc>
+                <a:tc>
+                  <a:txBody>
+                    <a:bodyPr/>
+                    <a:lstStyle/>
+                    <a:p>
+                      <a:pPr>
+                        <a:defRPr sz="1200"/>
+                      </a:pPr>
+                      <a:r>
+                        <a:t>Contextual</a:t>
+                      </a:r>
+                    </a:p>
+                  </a:txBody>
+                  <a:tcPr/>
+                </a:tc>
+                <a:extLst>
+                  <a:ext uri="{0D108BD9-81ED-4DB2-BD59-A6C34878D82A}">
+                    <a16:rowId xmlns:a16="http://schemas.microsoft.com/office/drawing/2014/main" val="10001"/>
+                  </a:ext>
+                </a:extLst>
               </a:tr>
-              <a:tr h="121920">
+              <a:tr h="182880">
                 <a:tc>
                   <a:txBody>
                     <a:bodyPr/>
@@ -3924,7 +4724,7 @@
                         <a:defRPr sz="1200"/>
                       </a:pPr>
                       <a:r>
-                        <a:t>Editorial</a:t>
+                        <a:t>🥈 2nd</a:t>
                       </a:r>
                     </a:p>
                   </a:txBody>
@@ -3939,7 +4739,7 @@
                         <a:defRPr sz="1200"/>
                       </a:pPr>
                       <a:r>
-                        <a:t>mr, nhs, of</a:t>
+                        <a:t>TF-IDF</a:t>
                       </a:r>
                     </a:p>
                   </a:txBody>
@@ -3954,14 +4754,34 @@
                         <a:defRPr sz="1200"/>
                       </a:pPr>
                       <a:r>
-                        <a:t>Institutions</a:t>
-                      </a:r>
-                    </a:p>
-                  </a:txBody>
-                  <a:tcPr/>
-                </a:tc>
+                        <a:t>86.58%</a:t>
+                      </a:r>
+                    </a:p>
+                  </a:txBody>
+                  <a:tcPr/>
+                </a:tc>
+                <a:tc>
+                  <a:txBody>
+                    <a:bodyPr/>
+                    <a:lstStyle/>
+                    <a:p>
+                      <a:pPr>
+                        <a:defRPr sz="1200"/>
+                      </a:pPr>
+                      <a:r>
+                        <a:t>Lexical</a:t>
+                      </a:r>
+                    </a:p>
+                  </a:txBody>
+                  <a:tcPr/>
+                </a:tc>
+                <a:extLst>
+                  <a:ext uri="{0D108BD9-81ED-4DB2-BD59-A6C34878D82A}">
+                    <a16:rowId xmlns:a16="http://schemas.microsoft.com/office/drawing/2014/main" val="10002"/>
+                  </a:ext>
+                </a:extLst>
               </a:tr>
-              <a:tr h="121920">
+              <a:tr h="182880">
                 <a:tc>
                   <a:txBody>
                     <a:bodyPr/>
@@ -3971,7 +4791,7 @@
                         <a:defRPr sz="1200"/>
                       </a:pPr>
                       <a:r>
-                        <a:t>Feature</a:t>
+                        <a:t>🥉 3rd</a:t>
                       </a:r>
                     </a:p>
                   </a:txBody>
@@ -3986,7 +4806,7 @@
                         <a:defRPr sz="1200"/>
                       </a:pPr>
                       <a:r>
-                        <a:t>i, my, said</a:t>
+                        <a:t>Linguistic</a:t>
                       </a:r>
                     </a:p>
                   </a:txBody>
@@ -4001,14 +4821,12 @@
                         <a:defRPr sz="1200"/>
                       </a:pPr>
                       <a:r>
-                        <a:t>Narrative, personal</a:t>
-                      </a:r>
-                    </a:p>
-                  </a:txBody>
-                  <a:tcPr/>
-                </a:tc>
-              </a:tr>
-              <a:tr h="121920">
+                        <a:t>65.00%</a:t>
+                      </a:r>
+                    </a:p>
+                  </a:txBody>
+                  <a:tcPr/>
+                </a:tc>
                 <a:tc>
                   <a:txBody>
                     <a:bodyPr/>
@@ -4018,89 +4836,17 @@
                         <a:defRPr sz="1200"/>
                       </a:pPr>
                       <a:r>
-                        <a:t>News</a:t>
-                      </a:r>
-                    </a:p>
-                  </a:txBody>
-                  <a:tcPr/>
-                </a:tc>
-                <a:tc>
-                  <a:txBody>
-                    <a:bodyPr/>
-                    <a:lstStyle/>
-                    <a:p>
-                      <a:pPr>
-                        <a:defRPr sz="1200"/>
-                      </a:pPr>
-                      <a:r>
-                        <a:t>trump, masters, after</a:t>
-                      </a:r>
-                    </a:p>
-                  </a:txBody>
-                  <a:tcPr/>
-                </a:tc>
-                <a:tc>
-                  <a:txBody>
-                    <a:bodyPr/>
-                    <a:lstStyle/>
-                    <a:p>
-                      <a:pPr>
-                        <a:defRPr sz="1200"/>
-                      </a:pPr>
-                      <a:r>
-                        <a:t>Events, facts</a:t>
-                      </a:r>
-                    </a:p>
-                  </a:txBody>
-                  <a:tcPr/>
-                </a:tc>
-              </a:tr>
-              <a:tr h="121920">
-                <a:tc>
-                  <a:txBody>
-                    <a:bodyPr/>
-                    <a:lstStyle/>
-                    <a:p>
-                      <a:pPr>
-                        <a:defRPr sz="1200"/>
-                      </a:pPr>
-                      <a:r>
-                        <a:t>Review</a:t>
-                      </a:r>
-                    </a:p>
-                  </a:txBody>
-                  <a:tcPr/>
-                </a:tc>
-                <a:tc>
-                  <a:txBody>
-                    <a:bodyPr/>
-                    <a:lstStyle/>
-                    <a:p>
-                      <a:pPr>
-                        <a:defRPr sz="1200"/>
-                      </a:pPr>
-                      <a:r>
-                        <a:t>staging, debut, opera</a:t>
-                      </a:r>
-                    </a:p>
-                  </a:txBody>
-                  <a:tcPr/>
-                </a:tc>
-                <a:tc>
-                  <a:txBody>
-                    <a:bodyPr/>
-                    <a:lstStyle/>
-                    <a:p>
-                      <a:pPr>
-                        <a:defRPr sz="1200"/>
-                      </a:pPr>
-                      <a:r>
-                        <a:t>Culture, arts</a:t>
-                      </a:r>
-                    </a:p>
-                  </a:txBody>
-                  <a:tcPr/>
-                </a:tc>
+                        <a:t>Syntactic</a:t>
+                      </a:r>
+                    </a:p>
+                  </a:txBody>
+                  <a:tcPr/>
+                </a:tc>
+                <a:extLst>
+                  <a:ext uri="{0D108BD9-81ED-4DB2-BD59-A6C34878D82A}">
+                    <a16:rowId xmlns:a16="http://schemas.microsoft.com/office/drawing/2014/main" val="10003"/>
+                  </a:ext>
+                </a:extLst>
               </a:tr>
             </a:tbl>
           </a:graphicData>
@@ -4114,8 +4860,8 @@
 </p:sld>
 </file>
 
-<file path=ppt/slides/slide16.xml><?xml version="1.0" encoding="utf-8"?>
-<p:sld xmlns:a="http://schemas.openxmlformats.org/drawingml/2006/main" xmlns:p="http://schemas.openxmlformats.org/presentationml/2006/main" xmlns:r="http://schemas.openxmlformats.org/officeDocument/2006/relationships">
+<file path=ppt/slides/slide19.xml><?xml version="1.0" encoding="utf-8"?>
+<p:sld xmlns:a="http://schemas.openxmlformats.org/drawingml/2006/main" xmlns:r="http://schemas.openxmlformats.org/officeDocument/2006/relationships" xmlns:p="http://schemas.openxmlformats.org/presentationml/2006/main">
   <p:cSld>
     <p:spTree>
       <p:nvGrpSpPr>
@@ -4123,7 +4869,14 @@
         <p:cNvGrpSpPr/>
         <p:nvPr/>
       </p:nvGrpSpPr>
-      <p:grpSpPr/>
+      <p:grpSpPr>
+        <a:xfrm>
+          <a:off x="0" y="0"/>
+          <a:ext cx="0" cy="0"/>
+          <a:chOff x="0" y="0"/>
+          <a:chExt cx="0" cy="0"/>
+        </a:xfrm>
+      </p:grpSpPr>
       <p:sp>
         <p:nvSpPr>
           <p:cNvPr id="2" name="Title 1"/>
@@ -4140,243 +4893,7 @@
           <a:lstStyle/>
           <a:p>
             <a:r>
-              <a:t>Universal Markers Across All Genres</a:t>
-            </a:r>
-          </a:p>
-        </p:txBody>
-      </p:sp>
-      <p:sp>
-        <p:nvSpPr>
-          <p:cNvPr id="3" name="Content Placeholder 2"/>
-          <p:cNvSpPr>
-            <a:spLocks noGrp="1"/>
-          </p:cNvSpPr>
-          <p:nvPr>
-            <p:ph idx="1"/>
-          </p:nvPr>
-        </p:nvSpPr>
-        <p:spPr/>
-        <p:txBody>
-          <a:bodyPr/>
-          <a:lstStyle/>
-          <a:p/>
-          <a:p>
-            <a:pPr>
-              <a:defRPr sz="1800"/>
-            </a:pPr>
-            <a:r>
-              <a:t>Common high-attention tokens:</a:t>
-            </a:r>
-          </a:p>
-          <a:p>
-            <a:pPr>
-              <a:defRPr sz="1800"/>
-            </a:pPr>
-            <a:r>
-              <a:t>• 'we', 'related', 'sp' (function words)</a:t>
-            </a:r>
-          </a:p>
-          <a:p>
-            <a:pPr>
-              <a:defRPr sz="1800"/>
-            </a:pPr>
-          </a:p>
-          <a:p>
-            <a:pPr>
-              <a:defRPr sz="1800"/>
-            </a:pPr>
-            <a:r>
-              <a:t>Key insight:</a:t>
-            </a:r>
-          </a:p>
-          <a:p>
-            <a:pPr>
-              <a:defRPr sz="1800"/>
-            </a:pPr>
-            <a:r>
-              <a:t>→ No unique vocabulary for any genre</a:t>
-            </a:r>
-          </a:p>
-          <a:p>
-            <a:pPr>
-              <a:defRPr sz="1800"/>
-            </a:pPr>
-            <a:r>
-              <a:t>→ Overlapping token distributions</a:t>
-            </a:r>
-          </a:p>
-          <a:p>
-            <a:pPr>
-              <a:defRPr sz="1800"/>
-            </a:pPr>
-            <a:r>
-              <a:t>→ Explains gradient boundaries</a:t>
-            </a:r>
-          </a:p>
-          <a:p>
-            <a:pPr>
-              <a:defRPr sz="1800"/>
-            </a:pPr>
-          </a:p>
-          <a:p>
-            <a:pPr>
-              <a:defRPr sz="1800"/>
-            </a:pPr>
-            <a:r>
-              <a:t>Genres blend into each other; boundaries are permeable</a:t>
-            </a:r>
-          </a:p>
-        </p:txBody>
-      </p:sp>
-    </p:spTree>
-  </p:cSld>
-  <p:clrMapOvr>
-    <a:masterClrMapping/>
-  </p:clrMapOvr>
-</p:sld>
-</file>
-
-<file path=ppt/slides/slide17.xml><?xml version="1.0" encoding="utf-8"?>
-<p:sld xmlns:a="http://schemas.openxmlformats.org/drawingml/2006/main" xmlns:p="http://schemas.openxmlformats.org/presentationml/2006/main" xmlns:r="http://schemas.openxmlformats.org/officeDocument/2006/relationships">
-  <p:cSld>
-    <p:spTree>
-      <p:nvGrpSpPr>
-        <p:cNvPr id="1" name=""/>
-        <p:cNvGrpSpPr/>
-        <p:nvPr/>
-      </p:nvGrpSpPr>
-      <p:grpSpPr/>
-      <p:sp>
-        <p:nvSpPr>
-          <p:cNvPr id="2" name="Title 1"/>
-          <p:cNvSpPr>
-            <a:spLocks noGrp="1"/>
-          </p:cNvSpPr>
-          <p:nvPr>
-            <p:ph type="title"/>
-          </p:nvPr>
-        </p:nvSpPr>
-        <p:spPr/>
-        <p:txBody>
-          <a:bodyPr/>
-          <a:lstStyle/>
-          <a:p>
-            <a:r>
-              <a:t>Theoretical Implications</a:t>
-            </a:r>
-          </a:p>
-        </p:txBody>
-      </p:sp>
-      <p:sp>
-        <p:nvSpPr>
-          <p:cNvPr id="3" name="Content Placeholder 2"/>
-          <p:cNvSpPr>
-            <a:spLocks noGrp="1"/>
-          </p:cNvSpPr>
-          <p:nvPr>
-            <p:ph idx="1"/>
-          </p:nvPr>
-        </p:nvSpPr>
-        <p:spPr/>
-        <p:txBody>
-          <a:bodyPr/>
-          <a:lstStyle/>
-          <a:p/>
-          <a:p>
-            <a:pPr>
-              <a:defRPr sz="1800"/>
-            </a:pPr>
-            <a:r>
-              <a:t>1. Genre as gradient, not discrete</a:t>
-            </a:r>
-          </a:p>
-          <a:p>
-            <a:pPr>
-              <a:defRPr sz="1800"/>
-            </a:pPr>
-            <a:r>
-              <a:t>   → Empirical evidence from model disagreement</a:t>
-            </a:r>
-          </a:p>
-          <a:p>
-            <a:pPr>
-              <a:defRPr sz="1800"/>
-            </a:pPr>
-          </a:p>
-          <a:p>
-            <a:pPr>
-              <a:defRPr sz="1800"/>
-            </a:pPr>
-            <a:r>
-              <a:t>2. Lexical primacy in genre classification</a:t>
-            </a:r>
-          </a:p>
-          <a:p>
-            <a:pPr>
-              <a:defRPr sz="1800"/>
-            </a:pPr>
-            <a:r>
-              <a:t>   → Word choice outweighs syntax and context</a:t>
-            </a:r>
-          </a:p>
-          <a:p>
-            <a:pPr>
-              <a:defRPr sz="1800"/>
-            </a:pPr>
-          </a:p>
-          <a:p>
-            <a:pPr>
-              <a:defRPr sz="1800"/>
-            </a:pPr>
-            <a:r>
-              <a:t>3. Model disagreement as uncertainty metric</a:t>
-            </a:r>
-          </a:p>
-          <a:p>
-            <a:pPr>
-              <a:defRPr sz="1800"/>
-            </a:pPr>
-            <a:r>
-              <a:t>   → Flagging ambiguous cases for human review</a:t>
-            </a:r>
-          </a:p>
-        </p:txBody>
-      </p:sp>
-    </p:spTree>
-  </p:cSld>
-  <p:clrMapOvr>
-    <a:masterClrMapping/>
-  </p:clrMapOvr>
-</p:sld>
-</file>
-
-<file path=ppt/slides/slide18.xml><?xml version="1.0" encoding="utf-8"?>
-<p:sld xmlns:a="http://schemas.openxmlformats.org/drawingml/2006/main" xmlns:p="http://schemas.openxmlformats.org/presentationml/2006/main" xmlns:r="http://schemas.openxmlformats.org/officeDocument/2006/relationships">
-  <p:cSld>
-    <p:spTree>
-      <p:nvGrpSpPr>
-        <p:cNvPr id="1" name=""/>
-        <p:cNvGrpSpPr/>
-        <p:nvPr/>
-      </p:nvGrpSpPr>
-      <p:grpSpPr/>
-      <p:sp>
-        <p:nvSpPr>
-          <p:cNvPr id="2" name="Title 1"/>
-          <p:cNvSpPr>
-            <a:spLocks noGrp="1"/>
-          </p:cNvSpPr>
-          <p:nvPr>
-            <p:ph type="title"/>
-          </p:nvPr>
-        </p:nvSpPr>
-        <p:spPr/>
-        <p:txBody>
-          <a:bodyPr/>
-          <a:lstStyle/>
-          <a:p>
-            <a:r>
-              <a:t>Final Model Rankings</a:t>
+              <a:t>Hypothesis Testing Results</a:t>
             </a:r>
           </a:p>
         </p:txBody>
@@ -4400,324 +4917,27 @@
                 <a:tableStyleId>{5C22544A-7EE6-4342-B048-85BDC9FD1C3A}</a:tableStyleId>
               </a:tblPr>
               <a:tblGrid>
-                <a:gridCol w="2057400"/>
-                <a:gridCol w="2057400"/>
-                <a:gridCol w="2057400"/>
-                <a:gridCol w="2057400"/>
-              </a:tblGrid>
-              <a:tr h="182880">
-                <a:tc>
-                  <a:txBody>
-                    <a:bodyPr/>
-                    <a:lstStyle/>
-                    <a:p>
-                      <a:pPr>
-                        <a:defRPr b="1" sz="1400"/>
-                      </a:pPr>
-                      <a:r>
-                        <a:t>Rank</a:t>
-                      </a:r>
-                    </a:p>
-                  </a:txBody>
-                  <a:tcPr/>
-                </a:tc>
-                <a:tc>
-                  <a:txBody>
-                    <a:bodyPr/>
-                    <a:lstStyle/>
-                    <a:p>
-                      <a:pPr>
-                        <a:defRPr b="1" sz="1400"/>
-                      </a:pPr>
-                      <a:r>
-                        <a:t>Model</a:t>
-                      </a:r>
-                    </a:p>
-                  </a:txBody>
-                  <a:tcPr/>
-                </a:tc>
-                <a:tc>
-                  <a:txBody>
-                    <a:bodyPr/>
-                    <a:lstStyle/>
-                    <a:p>
-                      <a:pPr>
-                        <a:defRPr b="1" sz="1400"/>
-                      </a:pPr>
-                      <a:r>
-                        <a:t>Accuracy</a:t>
-                      </a:r>
-                    </a:p>
-                  </a:txBody>
-                  <a:tcPr/>
-                </a:tc>
-                <a:tc>
-                  <a:txBody>
-                    <a:bodyPr/>
-                    <a:lstStyle/>
-                    <a:p>
-                      <a:pPr>
-                        <a:defRPr b="1" sz="1400"/>
-                      </a:pPr>
-                      <a:r>
-                        <a:t>Level</a:t>
-                      </a:r>
-                    </a:p>
-                  </a:txBody>
-                  <a:tcPr/>
-                </a:tc>
-              </a:tr>
-              <a:tr h="182880">
-                <a:tc>
-                  <a:txBody>
-                    <a:bodyPr/>
-                    <a:lstStyle/>
-                    <a:p>
-                      <a:pPr>
-                        <a:defRPr sz="1200"/>
-                      </a:pPr>
-                      <a:r>
-                        <a:t>🥇 1st</a:t>
-                      </a:r>
-                    </a:p>
-                  </a:txBody>
-                  <a:tcPr/>
-                </a:tc>
-                <a:tc>
-                  <a:txBody>
-                    <a:bodyPr/>
-                    <a:lstStyle/>
-                    <a:p>
-                      <a:pPr>
-                        <a:defRPr sz="1200"/>
-                      </a:pPr>
-                      <a:r>
-                        <a:t>BERT</a:t>
-                      </a:r>
-                    </a:p>
-                  </a:txBody>
-                  <a:tcPr/>
-                </a:tc>
-                <a:tc>
-                  <a:txBody>
-                    <a:bodyPr/>
-                    <a:lstStyle/>
-                    <a:p>
-                      <a:pPr>
-                        <a:defRPr sz="1200"/>
-                      </a:pPr>
-                      <a:r>
-                        <a:t>87.64%</a:t>
-                      </a:r>
-                    </a:p>
-                  </a:txBody>
-                  <a:tcPr/>
-                </a:tc>
-                <a:tc>
-                  <a:txBody>
-                    <a:bodyPr/>
-                    <a:lstStyle/>
-                    <a:p>
-                      <a:pPr>
-                        <a:defRPr sz="1200"/>
-                      </a:pPr>
-                      <a:r>
-                        <a:t>Contextual</a:t>
-                      </a:r>
-                    </a:p>
-                  </a:txBody>
-                  <a:tcPr/>
-                </a:tc>
-              </a:tr>
-              <a:tr h="182880">
-                <a:tc>
-                  <a:txBody>
-                    <a:bodyPr/>
-                    <a:lstStyle/>
-                    <a:p>
-                      <a:pPr>
-                        <a:defRPr sz="1200"/>
-                      </a:pPr>
-                      <a:r>
-                        <a:t>🥈 2nd</a:t>
-                      </a:r>
-                    </a:p>
-                  </a:txBody>
-                  <a:tcPr/>
-                </a:tc>
-                <a:tc>
-                  <a:txBody>
-                    <a:bodyPr/>
-                    <a:lstStyle/>
-                    <a:p>
-                      <a:pPr>
-                        <a:defRPr sz="1200"/>
-                      </a:pPr>
-                      <a:r>
-                        <a:t>TF-IDF</a:t>
-                      </a:r>
-                    </a:p>
-                  </a:txBody>
-                  <a:tcPr/>
-                </a:tc>
-                <a:tc>
-                  <a:txBody>
-                    <a:bodyPr/>
-                    <a:lstStyle/>
-                    <a:p>
-                      <a:pPr>
-                        <a:defRPr sz="1200"/>
-                      </a:pPr>
-                      <a:r>
-                        <a:t>86.58%</a:t>
-                      </a:r>
-                    </a:p>
-                  </a:txBody>
-                  <a:tcPr/>
-                </a:tc>
-                <a:tc>
-                  <a:txBody>
-                    <a:bodyPr/>
-                    <a:lstStyle/>
-                    <a:p>
-                      <a:pPr>
-                        <a:defRPr sz="1200"/>
-                      </a:pPr>
-                      <a:r>
-                        <a:t>Lexical</a:t>
-                      </a:r>
-                    </a:p>
-                  </a:txBody>
-                  <a:tcPr/>
-                </a:tc>
-              </a:tr>
-              <a:tr h="182880">
-                <a:tc>
-                  <a:txBody>
-                    <a:bodyPr/>
-                    <a:lstStyle/>
-                    <a:p>
-                      <a:pPr>
-                        <a:defRPr sz="1200"/>
-                      </a:pPr>
-                      <a:r>
-                        <a:t>🥉 3rd</a:t>
-                      </a:r>
-                    </a:p>
-                  </a:txBody>
-                  <a:tcPr/>
-                </a:tc>
-                <a:tc>
-                  <a:txBody>
-                    <a:bodyPr/>
-                    <a:lstStyle/>
-                    <a:p>
-                      <a:pPr>
-                        <a:defRPr sz="1200"/>
-                      </a:pPr>
-                      <a:r>
-                        <a:t>Linguistic</a:t>
-                      </a:r>
-                    </a:p>
-                  </a:txBody>
-                  <a:tcPr/>
-                </a:tc>
-                <a:tc>
-                  <a:txBody>
-                    <a:bodyPr/>
-                    <a:lstStyle/>
-                    <a:p>
-                      <a:pPr>
-                        <a:defRPr sz="1200"/>
-                      </a:pPr>
-                      <a:r>
-                        <a:t>65.00%</a:t>
-                      </a:r>
-                    </a:p>
-                  </a:txBody>
-                  <a:tcPr/>
-                </a:tc>
-                <a:tc>
-                  <a:txBody>
-                    <a:bodyPr/>
-                    <a:lstStyle/>
-                    <a:p>
-                      <a:pPr>
-                        <a:defRPr sz="1200"/>
-                      </a:pPr>
-                      <a:r>
-                        <a:t>Syntactic</a:t>
-                      </a:r>
-                    </a:p>
-                  </a:txBody>
-                  <a:tcPr/>
-                </a:tc>
-              </a:tr>
-            </a:tbl>
-          </a:graphicData>
-        </a:graphic>
-      </p:graphicFrame>
-    </p:spTree>
-  </p:cSld>
-  <p:clrMapOvr>
-    <a:masterClrMapping/>
-  </p:clrMapOvr>
-</p:sld>
-</file>
-
-<file path=ppt/slides/slide19.xml><?xml version="1.0" encoding="utf-8"?>
-<p:sld xmlns:a="http://schemas.openxmlformats.org/drawingml/2006/main" xmlns:p="http://schemas.openxmlformats.org/presentationml/2006/main" xmlns:r="http://schemas.openxmlformats.org/officeDocument/2006/relationships">
-  <p:cSld>
-    <p:spTree>
-      <p:nvGrpSpPr>
-        <p:cNvPr id="1" name=""/>
-        <p:cNvGrpSpPr/>
-        <p:nvPr/>
-      </p:nvGrpSpPr>
-      <p:grpSpPr/>
-      <p:sp>
-        <p:nvSpPr>
-          <p:cNvPr id="2" name="Title 1"/>
-          <p:cNvSpPr>
-            <a:spLocks noGrp="1"/>
-          </p:cNvSpPr>
-          <p:nvPr>
-            <p:ph type="title"/>
-          </p:nvPr>
-        </p:nvSpPr>
-        <p:spPr/>
-        <p:txBody>
-          <a:bodyPr/>
-          <a:lstStyle/>
-          <a:p>
-            <a:r>
-              <a:t>Hypothesis Testing Results</a:t>
-            </a:r>
-          </a:p>
-        </p:txBody>
-      </p:sp>
-      <p:graphicFrame>
-        <p:nvGraphicFramePr>
-          <p:cNvPr id="3" name="Table 2"/>
-          <p:cNvGraphicFramePr>
-            <a:graphicFrameLocks noGrp="1"/>
-          </p:cNvGraphicFramePr>
-          <p:nvPr/>
-        </p:nvGraphicFramePr>
-        <p:xfrm>
-          <a:off x="457200" y="1371600"/>
-          <a:ext cx="8229600" cy="731520"/>
-        </p:xfrm>
-        <a:graphic>
-          <a:graphicData uri="http://schemas.openxmlformats.org/drawingml/2006/table">
-            <a:tbl>
-              <a:tblPr firstRow="1" bandRow="1">
-                <a:tableStyleId>{5C22544A-7EE6-4342-B048-85BDC9FD1C3A}</a:tableStyleId>
-              </a:tblPr>
-              <a:tblGrid>
-                <a:gridCol w="2743200"/>
-                <a:gridCol w="2743200"/>
-                <a:gridCol w="2743200"/>
+                <a:gridCol w="2743200">
+                  <a:extLst>
+                    <a:ext uri="{9D8B030D-6E8A-4147-A177-3AD203B41FA5}">
+                      <a16:colId xmlns:a16="http://schemas.microsoft.com/office/drawing/2014/main" val="20000"/>
+                    </a:ext>
+                  </a:extLst>
+                </a:gridCol>
+                <a:gridCol w="2743200">
+                  <a:extLst>
+                    <a:ext uri="{9D8B030D-6E8A-4147-A177-3AD203B41FA5}">
+                      <a16:colId xmlns:a16="http://schemas.microsoft.com/office/drawing/2014/main" val="20001"/>
+                    </a:ext>
+                  </a:extLst>
+                </a:gridCol>
+                <a:gridCol w="2743200">
+                  <a:extLst>
+                    <a:ext uri="{9D8B030D-6E8A-4147-A177-3AD203B41FA5}">
+                      <a16:colId xmlns:a16="http://schemas.microsoft.com/office/drawing/2014/main" val="20002"/>
+                    </a:ext>
+                  </a:extLst>
+                </a:gridCol>
               </a:tblGrid>
               <a:tr h="146304">
                 <a:tc>
@@ -4726,7 +4946,7 @@
                     <a:lstStyle/>
                     <a:p>
                       <a:pPr>
-                        <a:defRPr b="1" sz="1400"/>
+                        <a:defRPr sz="1400" b="1"/>
                       </a:pPr>
                       <a:r>
                         <a:t>Hypothesis</a:t>
@@ -4741,7 +4961,7 @@
                     <a:lstStyle/>
                     <a:p>
                       <a:pPr>
-                        <a:defRPr b="1" sz="1400"/>
+                        <a:defRPr sz="1400" b="1"/>
                       </a:pPr>
                       <a:r>
                         <a:t>Result</a:t>
@@ -4756,7 +4976,7 @@
                     <a:lstStyle/>
                     <a:p>
                       <a:pPr>
-                        <a:defRPr b="1" sz="1400"/>
+                        <a:defRPr sz="1400" b="1"/>
                       </a:pPr>
                       <a:r>
                         <a:t>Evidence</a:t>
@@ -4765,6 +4985,11 @@
                   </a:txBody>
                   <a:tcPr/>
                 </a:tc>
+                <a:extLst>
+                  <a:ext uri="{0D108BD9-81ED-4DB2-BD59-A6C34878D82A}">
+                    <a16:rowId xmlns:a16="http://schemas.microsoft.com/office/drawing/2014/main" val="10000"/>
+                  </a:ext>
+                </a:extLst>
               </a:tr>
               <a:tr h="146304">
                 <a:tc>
@@ -4812,6 +5037,11 @@
                   </a:txBody>
                   <a:tcPr/>
                 </a:tc>
+                <a:extLst>
+                  <a:ext uri="{0D108BD9-81ED-4DB2-BD59-A6C34878D82A}">
+                    <a16:rowId xmlns:a16="http://schemas.microsoft.com/office/drawing/2014/main" val="10001"/>
+                  </a:ext>
+                </a:extLst>
               </a:tr>
               <a:tr h="146304">
                 <a:tc>
@@ -4859,6 +5089,11 @@
                   </a:txBody>
                   <a:tcPr/>
                 </a:tc>
+                <a:extLst>
+                  <a:ext uri="{0D108BD9-81ED-4DB2-BD59-A6C34878D82A}">
+                    <a16:rowId xmlns:a16="http://schemas.microsoft.com/office/drawing/2014/main" val="10002"/>
+                  </a:ext>
+                </a:extLst>
               </a:tr>
               <a:tr h="146304">
                 <a:tc>
@@ -4906,6 +5141,11 @@
                   </a:txBody>
                   <a:tcPr/>
                 </a:tc>
+                <a:extLst>
+                  <a:ext uri="{0D108BD9-81ED-4DB2-BD59-A6C34878D82A}">
+                    <a16:rowId xmlns:a16="http://schemas.microsoft.com/office/drawing/2014/main" val="10003"/>
+                  </a:ext>
+                </a:extLst>
               </a:tr>
               <a:tr h="146304">
                 <a:tc>
@@ -4953,6 +5193,11 @@
                   </a:txBody>
                   <a:tcPr/>
                 </a:tc>
+                <a:extLst>
+                  <a:ext uri="{0D108BD9-81ED-4DB2-BD59-A6C34878D82A}">
+                    <a16:rowId xmlns:a16="http://schemas.microsoft.com/office/drawing/2014/main" val="10004"/>
+                  </a:ext>
+                </a:extLst>
               </a:tr>
             </a:tbl>
           </a:graphicData>
@@ -4967,7 +5212,7 @@
 </file>
 
 <file path=ppt/slides/slide2.xml><?xml version="1.0" encoding="utf-8"?>
-<p:sld xmlns:a="http://schemas.openxmlformats.org/drawingml/2006/main" xmlns:p="http://schemas.openxmlformats.org/presentationml/2006/main" xmlns:r="http://schemas.openxmlformats.org/officeDocument/2006/relationships">
+<p:sld xmlns:a="http://schemas.openxmlformats.org/drawingml/2006/main" xmlns:r="http://schemas.openxmlformats.org/officeDocument/2006/relationships" xmlns:p="http://schemas.openxmlformats.org/presentationml/2006/main">
   <p:cSld>
     <p:spTree>
       <p:nvGrpSpPr>
@@ -4975,7 +5220,14 @@
         <p:cNvGrpSpPr/>
         <p:nvPr/>
       </p:nvGrpSpPr>
-      <p:grpSpPr/>
+      <p:grpSpPr>
+        <a:xfrm>
+          <a:off x="0" y="0"/>
+          <a:ext cx="0" cy="0"/>
+          <a:chOff x="0" y="0"/>
+          <a:chExt cx="0" cy="0"/>
+        </a:xfrm>
+      </p:grpSpPr>
       <p:sp>
         <p:nvSpPr>
           <p:cNvPr id="2" name="Title 1"/>
@@ -5011,7 +5263,9 @@
         <p:txBody>
           <a:bodyPr/>
           <a:lstStyle/>
-          <a:p/>
+          <a:p>
+            <a:endParaRPr/>
+          </a:p>
           <a:p>
             <a:pPr>
               <a:defRPr sz="1800"/>
@@ -5024,6 +5278,7 @@
             <a:pPr>
               <a:defRPr sz="1800"/>
             </a:pPr>
+            <a:endParaRPr/>
           </a:p>
           <a:p>
             <a:pPr>
@@ -5076,7 +5331,7 @@
 </file>
 
 <file path=ppt/slides/slide20.xml><?xml version="1.0" encoding="utf-8"?>
-<p:sld xmlns:a="http://schemas.openxmlformats.org/drawingml/2006/main" xmlns:p="http://schemas.openxmlformats.org/presentationml/2006/main" xmlns:r="http://schemas.openxmlformats.org/officeDocument/2006/relationships">
+<p:sld xmlns:a="http://schemas.openxmlformats.org/drawingml/2006/main" xmlns:r="http://schemas.openxmlformats.org/officeDocument/2006/relationships" xmlns:p="http://schemas.openxmlformats.org/presentationml/2006/main">
   <p:cSld>
     <p:spTree>
       <p:nvGrpSpPr>
@@ -5084,7 +5339,14 @@
         <p:cNvGrpSpPr/>
         <p:nvPr/>
       </p:nvGrpSpPr>
-      <p:grpSpPr/>
+      <p:grpSpPr>
+        <a:xfrm>
+          <a:off x="0" y="0"/>
+          <a:ext cx="0" cy="0"/>
+          <a:chOff x="0" y="0"/>
+          <a:chExt cx="0" cy="0"/>
+        </a:xfrm>
+      </p:grpSpPr>
       <p:sp>
         <p:nvSpPr>
           <p:cNvPr id="2" name="Title 1"/>
@@ -5120,7 +5382,9 @@
         <p:txBody>
           <a:bodyPr/>
           <a:lstStyle/>
-          <a:p/>
+          <a:p>
+            <a:endParaRPr/>
+          </a:p>
           <a:p>
             <a:pPr>
               <a:defRPr sz="1800"/>
@@ -5133,6 +5397,7 @@
             <a:pPr>
               <a:defRPr sz="1800"/>
             </a:pPr>
+            <a:endParaRPr/>
           </a:p>
           <a:p>
             <a:pPr>
@@ -5170,6 +5435,7 @@
             <a:pPr>
               <a:defRPr sz="1800"/>
             </a:pPr>
+            <a:endParaRPr/>
           </a:p>
           <a:p>
             <a:pPr>
@@ -5206,7 +5472,7 @@
 </file>
 
 <file path=ppt/slides/slide21.xml><?xml version="1.0" encoding="utf-8"?>
-<p:sld xmlns:a="http://schemas.openxmlformats.org/drawingml/2006/main" xmlns:p="http://schemas.openxmlformats.org/presentationml/2006/main" xmlns:r="http://schemas.openxmlformats.org/officeDocument/2006/relationships">
+<p:sld xmlns:a="http://schemas.openxmlformats.org/drawingml/2006/main" xmlns:r="http://schemas.openxmlformats.org/officeDocument/2006/relationships" xmlns:p="http://schemas.openxmlformats.org/presentationml/2006/main">
   <p:cSld>
     <p:spTree>
       <p:nvGrpSpPr>
@@ -5214,7 +5480,14 @@
         <p:cNvGrpSpPr/>
         <p:nvPr/>
       </p:nvGrpSpPr>
-      <p:grpSpPr/>
+      <p:grpSpPr>
+        <a:xfrm>
+          <a:off x="0" y="0"/>
+          <a:ext cx="0" cy="0"/>
+          <a:chOff x="0" y="0"/>
+          <a:chExt cx="0" cy="0"/>
+        </a:xfrm>
+      </p:grpSpPr>
       <p:sp>
         <p:nvSpPr>
           <p:cNvPr id="2" name="Title 1"/>
@@ -5250,7 +5523,9 @@
         <p:txBody>
           <a:bodyPr/>
           <a:lstStyle/>
-          <a:p/>
+          <a:p>
+            <a:endParaRPr/>
+          </a:p>
           <a:p>
             <a:pPr>
               <a:defRPr sz="1800"/>
@@ -5287,6 +5562,7 @@
             <a:pPr>
               <a:defRPr sz="1800"/>
             </a:pPr>
+            <a:endParaRPr/>
           </a:p>
           <a:p>
             <a:pPr>
@@ -5323,7 +5599,7 @@
 </file>
 
 <file path=ppt/slides/slide22.xml><?xml version="1.0" encoding="utf-8"?>
-<p:sld xmlns:a="http://schemas.openxmlformats.org/drawingml/2006/main" xmlns:p="http://schemas.openxmlformats.org/presentationml/2006/main" xmlns:r="http://schemas.openxmlformats.org/officeDocument/2006/relationships">
+<p:sld xmlns:a="http://schemas.openxmlformats.org/drawingml/2006/main" xmlns:r="http://schemas.openxmlformats.org/officeDocument/2006/relationships" xmlns:p="http://schemas.openxmlformats.org/presentationml/2006/main">
   <p:cSld>
     <p:spTree>
       <p:nvGrpSpPr>
@@ -5331,7 +5607,14 @@
         <p:cNvGrpSpPr/>
         <p:nvPr/>
       </p:nvGrpSpPr>
-      <p:grpSpPr/>
+      <p:grpSpPr>
+        <a:xfrm>
+          <a:off x="0" y="0"/>
+          <a:ext cx="0" cy="0"/>
+          <a:chOff x="0" y="0"/>
+          <a:chExt cx="0" cy="0"/>
+        </a:xfrm>
+      </p:grpSpPr>
       <p:sp>
         <p:nvSpPr>
           <p:cNvPr id="2" name="Title 1"/>
@@ -5372,7 +5655,9 @@
               <a:t>Questions?</a:t>
             </a:r>
           </a:p>
-          <a:p/>
+          <a:p>
+            <a:endParaRPr/>
+          </a:p>
           <a:p>
             <a:r>
               <a:t>Dialogue 2026</a:t>
@@ -5394,7 +5679,7 @@
 </file>
 
 <file path=ppt/slides/slide3.xml><?xml version="1.0" encoding="utf-8"?>
-<p:sld xmlns:a="http://schemas.openxmlformats.org/drawingml/2006/main" xmlns:p="http://schemas.openxmlformats.org/presentationml/2006/main" xmlns:r="http://schemas.openxmlformats.org/officeDocument/2006/relationships">
+<p:sld xmlns:a="http://schemas.openxmlformats.org/drawingml/2006/main" xmlns:r="http://schemas.openxmlformats.org/officeDocument/2006/relationships" xmlns:p="http://schemas.openxmlformats.org/presentationml/2006/main">
   <p:cSld>
     <p:spTree>
       <p:nvGrpSpPr>
@@ -5402,7 +5687,14 @@
         <p:cNvGrpSpPr/>
         <p:nvPr/>
       </p:nvGrpSpPr>
-      <p:grpSpPr/>
+      <p:grpSpPr>
+        <a:xfrm>
+          <a:off x="0" y="0"/>
+          <a:ext cx="0" cy="0"/>
+          <a:chOff x="0" y="0"/>
+          <a:chExt cx="0" cy="0"/>
+        </a:xfrm>
+      </p:grpSpPr>
       <p:sp>
         <p:nvSpPr>
           <p:cNvPr id="2" name="Title 1"/>
@@ -5438,7 +5730,9 @@
         <p:txBody>
           <a:bodyPr/>
           <a:lstStyle/>
-          <a:p/>
+          <a:p>
+            <a:endParaRPr/>
+          </a:p>
           <a:p>
             <a:pPr>
               <a:defRPr sz="1800"/>
@@ -5451,6 +5745,7 @@
             <a:pPr>
               <a:defRPr sz="1800"/>
             </a:pPr>
+            <a:endParaRPr/>
           </a:p>
           <a:p>
             <a:pPr>
@@ -5480,6 +5775,7 @@
             <a:pPr>
               <a:defRPr sz="1800"/>
             </a:pPr>
+            <a:endParaRPr/>
           </a:p>
           <a:p>
             <a:pPr>
@@ -5500,7 +5796,7 @@
 </file>
 
 <file path=ppt/slides/slide4.xml><?xml version="1.0" encoding="utf-8"?>
-<p:sld xmlns:a="http://schemas.openxmlformats.org/drawingml/2006/main" xmlns:p="http://schemas.openxmlformats.org/presentationml/2006/main" xmlns:r="http://schemas.openxmlformats.org/officeDocument/2006/relationships">
+<p:sld xmlns:a="http://schemas.openxmlformats.org/drawingml/2006/main" xmlns:r="http://schemas.openxmlformats.org/officeDocument/2006/relationships" xmlns:p="http://schemas.openxmlformats.org/presentationml/2006/main">
   <p:cSld>
     <p:spTree>
       <p:nvGrpSpPr>
@@ -5508,7 +5804,14 @@
         <p:cNvGrpSpPr/>
         <p:nvPr/>
       </p:nvGrpSpPr>
-      <p:grpSpPr/>
+      <p:grpSpPr>
+        <a:xfrm>
+          <a:off x="0" y="0"/>
+          <a:ext cx="0" cy="0"/>
+          <a:chOff x="0" y="0"/>
+          <a:chExt cx="0" cy="0"/>
+        </a:xfrm>
+      </p:grpSpPr>
       <p:sp>
         <p:nvSpPr>
           <p:cNvPr id="2" name="Title 1"/>
@@ -5544,7 +5847,9 @@
         <p:txBody>
           <a:bodyPr/>
           <a:lstStyle/>
-          <a:p/>
+          <a:p>
+            <a:endParaRPr/>
+          </a:p>
           <a:p>
             <a:pPr>
               <a:defRPr sz="1800"/>
@@ -5565,6 +5870,7 @@
             <a:pPr>
               <a:defRPr sz="1800"/>
             </a:pPr>
+            <a:endParaRPr/>
           </a:p>
           <a:p>
             <a:pPr>
@@ -5625,7 +5931,7 @@
 </file>
 
 <file path=ppt/slides/slide5.xml><?xml version="1.0" encoding="utf-8"?>
-<p:sld xmlns:a="http://schemas.openxmlformats.org/drawingml/2006/main" xmlns:p="http://schemas.openxmlformats.org/presentationml/2006/main" xmlns:r="http://schemas.openxmlformats.org/officeDocument/2006/relationships">
+<p:sld xmlns:a="http://schemas.openxmlformats.org/drawingml/2006/main" xmlns:r="http://schemas.openxmlformats.org/officeDocument/2006/relationships" xmlns:p="http://schemas.openxmlformats.org/presentationml/2006/main">
   <p:cSld>
     <p:spTree>
       <p:nvGrpSpPr>
@@ -5633,7 +5939,14 @@
         <p:cNvGrpSpPr/>
         <p:nvPr/>
       </p:nvGrpSpPr>
-      <p:grpSpPr/>
+      <p:grpSpPr>
+        <a:xfrm>
+          <a:off x="0" y="0"/>
+          <a:ext cx="0" cy="0"/>
+          <a:chOff x="0" y="0"/>
+          <a:chExt cx="0" cy="0"/>
+        </a:xfrm>
+      </p:grpSpPr>
       <p:sp>
         <p:nvSpPr>
           <p:cNvPr id="2" name="Title 1"/>
@@ -5661,11 +5974,17 @@
           <p:cNvGraphicFramePr>
             <a:graphicFrameLocks noGrp="1"/>
           </p:cNvGraphicFramePr>
-          <p:nvPr/>
+          <p:nvPr>
+            <p:extLst>
+              <p:ext uri="{D42A27DB-BD31-4B8C-83A1-F6EECF244321}">
+                <p14:modId xmlns:p14="http://schemas.microsoft.com/office/powerpoint/2010/main" val="3982180962"/>
+              </p:ext>
+            </p:extLst>
+          </p:nvPr>
         </p:nvGraphicFramePr>
         <p:xfrm>
-          <a:off x="457200" y="1371600"/>
-          <a:ext cx="8229600" cy="731520"/>
+          <a:off x="457200" y="1903227"/>
+          <a:ext cx="8229600" cy="1127760"/>
         </p:xfrm>
         <a:graphic>
           <a:graphicData uri="http://schemas.openxmlformats.org/drawingml/2006/table">
@@ -5674,10 +5993,34 @@
                 <a:tableStyleId>{5C22544A-7EE6-4342-B048-85BDC9FD1C3A}</a:tableStyleId>
               </a:tblPr>
               <a:tblGrid>
-                <a:gridCol w="2057400"/>
-                <a:gridCol w="2057400"/>
-                <a:gridCol w="2057400"/>
-                <a:gridCol w="2057400"/>
+                <a:gridCol w="2057400">
+                  <a:extLst>
+                    <a:ext uri="{9D8B030D-6E8A-4147-A177-3AD203B41FA5}">
+                      <a16:colId xmlns:a16="http://schemas.microsoft.com/office/drawing/2014/main" val="20000"/>
+                    </a:ext>
+                  </a:extLst>
+                </a:gridCol>
+                <a:gridCol w="2057400">
+                  <a:extLst>
+                    <a:ext uri="{9D8B030D-6E8A-4147-A177-3AD203B41FA5}">
+                      <a16:colId xmlns:a16="http://schemas.microsoft.com/office/drawing/2014/main" val="20001"/>
+                    </a:ext>
+                  </a:extLst>
+                </a:gridCol>
+                <a:gridCol w="2057400">
+                  <a:extLst>
+                    <a:ext uri="{9D8B030D-6E8A-4147-A177-3AD203B41FA5}">
+                      <a16:colId xmlns:a16="http://schemas.microsoft.com/office/drawing/2014/main" val="20002"/>
+                    </a:ext>
+                  </a:extLst>
+                </a:gridCol>
+                <a:gridCol w="2057400">
+                  <a:extLst>
+                    <a:ext uri="{9D8B030D-6E8A-4147-A177-3AD203B41FA5}">
+                      <a16:colId xmlns:a16="http://schemas.microsoft.com/office/drawing/2014/main" val="20003"/>
+                    </a:ext>
+                  </a:extLst>
+                </a:gridCol>
               </a:tblGrid>
               <a:tr h="182880">
                 <a:tc>
@@ -5686,7 +6029,7 @@
                     <a:lstStyle/>
                     <a:p>
                       <a:pPr>
-                        <a:defRPr b="1" sz="1400"/>
+                        <a:defRPr sz="1400" b="1"/>
                       </a:pPr>
                       <a:r>
                         <a:t>Model</a:t>
@@ -5701,7 +6044,7 @@
                     <a:lstStyle/>
                     <a:p>
                       <a:pPr>
-                        <a:defRPr b="1" sz="1400"/>
+                        <a:defRPr sz="1400" b="1"/>
                       </a:pPr>
                       <a:r>
                         <a:t>Level</a:t>
@@ -5716,7 +6059,7 @@
                     <a:lstStyle/>
                     <a:p>
                       <a:pPr>
-                        <a:defRPr b="1" sz="1400"/>
+                        <a:defRPr sz="1400" b="1"/>
                       </a:pPr>
                       <a:r>
                         <a:t>Accuracy</a:t>
@@ -5731,7 +6074,7 @@
                     <a:lstStyle/>
                     <a:p>
                       <a:pPr>
-                        <a:defRPr b="1" sz="1400"/>
+                        <a:defRPr sz="1400" b="1"/>
                       </a:pPr>
                       <a:r>
                         <a:t>Macro F1</a:t>
@@ -5740,6 +6083,11 @@
                   </a:txBody>
                   <a:tcPr/>
                 </a:tc>
+                <a:extLst>
+                  <a:ext uri="{0D108BD9-81ED-4DB2-BD59-A6C34878D82A}">
+                    <a16:rowId xmlns:a16="http://schemas.microsoft.com/office/drawing/2014/main" val="10000"/>
+                  </a:ext>
+                </a:extLst>
               </a:tr>
               <a:tr h="182880">
                 <a:tc>
@@ -5802,6 +6150,11 @@
                   </a:txBody>
                   <a:tcPr/>
                 </a:tc>
+                <a:extLst>
+                  <a:ext uri="{0D108BD9-81ED-4DB2-BD59-A6C34878D82A}">
+                    <a16:rowId xmlns:a16="http://schemas.microsoft.com/office/drawing/2014/main" val="10001"/>
+                  </a:ext>
+                </a:extLst>
               </a:tr>
               <a:tr h="182880">
                 <a:tc>
@@ -5864,6 +6217,11 @@
                   </a:txBody>
                   <a:tcPr/>
                 </a:tc>
+                <a:extLst>
+                  <a:ext uri="{0D108BD9-81ED-4DB2-BD59-A6C34878D82A}">
+                    <a16:rowId xmlns:a16="http://schemas.microsoft.com/office/drawing/2014/main" val="10002"/>
+                  </a:ext>
+                </a:extLst>
               </a:tr>
               <a:tr h="182880">
                 <a:tc>
@@ -5875,6 +6233,7 @@
                         <a:defRPr sz="1200"/>
                       </a:pPr>
                       <a:r>
+                        <a:rPr dirty="0"/>
                         <a:t>Linguistic + RF</a:t>
                       </a:r>
                     </a:p>
@@ -5920,12 +6279,18 @@
                         <a:defRPr sz="1200"/>
                       </a:pPr>
                       <a:r>
+                        <a:rPr dirty="0"/>
                         <a:t>0.6449</a:t>
                       </a:r>
                     </a:p>
                   </a:txBody>
                   <a:tcPr/>
                 </a:tc>
+                <a:extLst>
+                  <a:ext uri="{0D108BD9-81ED-4DB2-BD59-A6C34878D82A}">
+                    <a16:rowId xmlns:a16="http://schemas.microsoft.com/office/drawing/2014/main" val="10003"/>
+                  </a:ext>
+                </a:extLst>
               </a:tr>
             </a:tbl>
           </a:graphicData>
@@ -5940,7 +6305,7 @@
 </file>
 
 <file path=ppt/slides/slide6.xml><?xml version="1.0" encoding="utf-8"?>
-<p:sld xmlns:a="http://schemas.openxmlformats.org/drawingml/2006/main" xmlns:p="http://schemas.openxmlformats.org/presentationml/2006/main" xmlns:r="http://schemas.openxmlformats.org/officeDocument/2006/relationships">
+<p:sld xmlns:a="http://schemas.openxmlformats.org/drawingml/2006/main" xmlns:r="http://schemas.openxmlformats.org/officeDocument/2006/relationships" xmlns:p="http://schemas.openxmlformats.org/presentationml/2006/main">
   <p:cSld>
     <p:spTree>
       <p:nvGrpSpPr>
@@ -5948,7 +6313,14 @@
         <p:cNvGrpSpPr/>
         <p:nvPr/>
       </p:nvGrpSpPr>
-      <p:grpSpPr/>
+      <p:grpSpPr>
+        <a:xfrm>
+          <a:off x="0" y="0"/>
+          <a:ext cx="0" cy="0"/>
+          <a:chOff x="0" y="0"/>
+          <a:chExt cx="0" cy="0"/>
+        </a:xfrm>
+      </p:grpSpPr>
       <p:sp>
         <p:nvSpPr>
           <p:cNvPr id="2" name="Title 1"/>
@@ -5984,7 +6356,9 @@
         <p:txBody>
           <a:bodyPr/>
           <a:lstStyle/>
-          <a:p/>
+          <a:p>
+            <a:endParaRPr/>
+          </a:p>
           <a:p>
             <a:pPr>
               <a:defRPr sz="1800"/>
@@ -5997,6 +6371,7 @@
             <a:pPr>
               <a:defRPr sz="1800"/>
             </a:pPr>
+            <a:endParaRPr/>
           </a:p>
           <a:p>
             <a:pPr>
@@ -6034,6 +6409,7 @@
             <a:pPr>
               <a:defRPr sz="1800"/>
             </a:pPr>
+            <a:endParaRPr/>
           </a:p>
           <a:p>
             <a:pPr>
@@ -6062,7 +6438,7 @@
 </file>
 
 <file path=ppt/slides/slide7.xml><?xml version="1.0" encoding="utf-8"?>
-<p:sld xmlns:a="http://schemas.openxmlformats.org/drawingml/2006/main" xmlns:p="http://schemas.openxmlformats.org/presentationml/2006/main" xmlns:r="http://schemas.openxmlformats.org/officeDocument/2006/relationships">
+<p:sld xmlns:a="http://schemas.openxmlformats.org/drawingml/2006/main" xmlns:r="http://schemas.openxmlformats.org/officeDocument/2006/relationships" xmlns:p="http://schemas.openxmlformats.org/presentationml/2006/main">
   <p:cSld>
     <p:spTree>
       <p:nvGrpSpPr>
@@ -6070,7 +6446,14 @@
         <p:cNvGrpSpPr/>
         <p:nvPr/>
       </p:nvGrpSpPr>
-      <p:grpSpPr/>
+      <p:grpSpPr>
+        <a:xfrm>
+          <a:off x="0" y="0"/>
+          <a:ext cx="0" cy="0"/>
+          <a:chOff x="0" y="0"/>
+          <a:chExt cx="0" cy="0"/>
+        </a:xfrm>
+      </p:grpSpPr>
       <p:sp>
         <p:nvSpPr>
           <p:cNvPr id="2" name="Title 1"/>
@@ -6106,7 +6489,9 @@
         <p:txBody>
           <a:bodyPr/>
           <a:lstStyle/>
-          <a:p/>
+          <a:p>
+            <a:endParaRPr/>
+          </a:p>
           <a:p>
             <a:pPr>
               <a:defRPr sz="1800"/>
@@ -6119,6 +6504,7 @@
             <a:pPr>
               <a:defRPr sz="1800"/>
             </a:pPr>
+            <a:endParaRPr/>
           </a:p>
           <a:p>
             <a:pPr>
@@ -6156,6 +6542,7 @@
             <a:pPr>
               <a:defRPr sz="1800"/>
             </a:pPr>
+            <a:endParaRPr/>
           </a:p>
           <a:p>
             <a:pPr>
@@ -6176,7 +6563,7 @@
 </file>
 
 <file path=ppt/slides/slide8.xml><?xml version="1.0" encoding="utf-8"?>
-<p:sld xmlns:a="http://schemas.openxmlformats.org/drawingml/2006/main" xmlns:p="http://schemas.openxmlformats.org/presentationml/2006/main" xmlns:r="http://schemas.openxmlformats.org/officeDocument/2006/relationships">
+<p:sld xmlns:a="http://schemas.openxmlformats.org/drawingml/2006/main" xmlns:r="http://schemas.openxmlformats.org/officeDocument/2006/relationships" xmlns:p="http://schemas.openxmlformats.org/presentationml/2006/main">
   <p:cSld>
     <p:spTree>
       <p:nvGrpSpPr>
@@ -6184,7 +6571,14 @@
         <p:cNvGrpSpPr/>
         <p:nvPr/>
       </p:nvGrpSpPr>
-      <p:grpSpPr/>
+      <p:grpSpPr>
+        <a:xfrm>
+          <a:off x="0" y="0"/>
+          <a:ext cx="0" cy="0"/>
+          <a:chOff x="0" y="0"/>
+          <a:chExt cx="0" cy="0"/>
+        </a:xfrm>
+      </p:grpSpPr>
       <p:sp>
         <p:nvSpPr>
           <p:cNvPr id="2" name="Title 1"/>
@@ -6220,7 +6614,9 @@
         <p:txBody>
           <a:bodyPr/>
           <a:lstStyle/>
-          <a:p/>
+          <a:p>
+            <a:endParaRPr/>
+          </a:p>
           <a:p>
             <a:pPr>
               <a:defRPr sz="1800"/>
@@ -6233,6 +6629,7 @@
             <a:pPr>
               <a:defRPr sz="1800"/>
             </a:pPr>
+            <a:endParaRPr/>
           </a:p>
           <a:p>
             <a:pPr>
@@ -6270,6 +6667,7 @@
             <a:pPr>
               <a:defRPr sz="1800"/>
             </a:pPr>
+            <a:endParaRPr/>
           </a:p>
           <a:p>
             <a:pPr>
@@ -6290,7 +6688,7 @@
 </file>
 
 <file path=ppt/slides/slide9.xml><?xml version="1.0" encoding="utf-8"?>
-<p:sld xmlns:a="http://schemas.openxmlformats.org/drawingml/2006/main" xmlns:p="http://schemas.openxmlformats.org/presentationml/2006/main" xmlns:r="http://schemas.openxmlformats.org/officeDocument/2006/relationships">
+<p:sld xmlns:a="http://schemas.openxmlformats.org/drawingml/2006/main" xmlns:r="http://schemas.openxmlformats.org/officeDocument/2006/relationships" xmlns:p="http://schemas.openxmlformats.org/presentationml/2006/main">
   <p:cSld>
     <p:spTree>
       <p:nvGrpSpPr>
@@ -6298,7 +6696,14 @@
         <p:cNvGrpSpPr/>
         <p:nvPr/>
       </p:nvGrpSpPr>
-      <p:grpSpPr/>
+      <p:grpSpPr>
+        <a:xfrm>
+          <a:off x="0" y="0"/>
+          <a:ext cx="0" cy="0"/>
+          <a:chOff x="0" y="0"/>
+          <a:chExt cx="0" cy="0"/>
+        </a:xfrm>
+      </p:grpSpPr>
       <p:sp>
         <p:nvSpPr>
           <p:cNvPr id="2" name="Title 1"/>
@@ -6326,11 +6731,17 @@
           <p:cNvGraphicFramePr>
             <a:graphicFrameLocks noGrp="1"/>
           </p:cNvGraphicFramePr>
-          <p:nvPr/>
+          <p:nvPr>
+            <p:extLst>
+              <p:ext uri="{D42A27DB-BD31-4B8C-83A1-F6EECF244321}">
+                <p14:modId xmlns:p14="http://schemas.microsoft.com/office/powerpoint/2010/main" val="2122782295"/>
+              </p:ext>
+            </p:extLst>
+          </p:nvPr>
         </p:nvGraphicFramePr>
         <p:xfrm>
-          <a:off x="457200" y="1371600"/>
-          <a:ext cx="8229600" cy="731520"/>
+          <a:off x="457200" y="1759334"/>
+          <a:ext cx="8229600" cy="1127760"/>
         </p:xfrm>
         <a:graphic>
           <a:graphicData uri="http://schemas.openxmlformats.org/drawingml/2006/table">
@@ -6339,9 +6750,27 @@
                 <a:tableStyleId>{5C22544A-7EE6-4342-B048-85BDC9FD1C3A}</a:tableStyleId>
               </a:tblPr>
               <a:tblGrid>
-                <a:gridCol w="2743200"/>
-                <a:gridCol w="2743200"/>
-                <a:gridCol w="2743200"/>
+                <a:gridCol w="2743200">
+                  <a:extLst>
+                    <a:ext uri="{9D8B030D-6E8A-4147-A177-3AD203B41FA5}">
+                      <a16:colId xmlns:a16="http://schemas.microsoft.com/office/drawing/2014/main" val="20000"/>
+                    </a:ext>
+                  </a:extLst>
+                </a:gridCol>
+                <a:gridCol w="2743200">
+                  <a:extLst>
+                    <a:ext uri="{9D8B030D-6E8A-4147-A177-3AD203B41FA5}">
+                      <a16:colId xmlns:a16="http://schemas.microsoft.com/office/drawing/2014/main" val="20001"/>
+                    </a:ext>
+                  </a:extLst>
+                </a:gridCol>
+                <a:gridCol w="2743200">
+                  <a:extLst>
+                    <a:ext uri="{9D8B030D-6E8A-4147-A177-3AD203B41FA5}">
+                      <a16:colId xmlns:a16="http://schemas.microsoft.com/office/drawing/2014/main" val="20002"/>
+                    </a:ext>
+                  </a:extLst>
+                </a:gridCol>
               </a:tblGrid>
               <a:tr h="182880">
                 <a:tc>
@@ -6350,7 +6779,7 @@
                     <a:lstStyle/>
                     <a:p>
                       <a:pPr>
-                        <a:defRPr b="1" sz="1400"/>
+                        <a:defRPr sz="1400" b="1"/>
                       </a:pPr>
                       <a:r>
                         <a:t>Model</a:t>
@@ -6365,7 +6794,7 @@
                     <a:lstStyle/>
                     <a:p>
                       <a:pPr>
-                        <a:defRPr b="1" sz="1400"/>
+                        <a:defRPr sz="1400" b="1"/>
                       </a:pPr>
                       <a:r>
                         <a:t>Accuracy</a:t>
@@ -6380,7 +6809,7 @@
                     <a:lstStyle/>
                     <a:p>
                       <a:pPr>
-                        <a:defRPr b="1" sz="1400"/>
+                        <a:defRPr sz="1400" b="1"/>
                       </a:pPr>
                       <a:r>
                         <a:t>95% CI</a:t>
@@ -6389,6 +6818,11 @@
                   </a:txBody>
                   <a:tcPr/>
                 </a:tc>
+                <a:extLst>
+                  <a:ext uri="{0D108BD9-81ED-4DB2-BD59-A6C34878D82A}">
+                    <a16:rowId xmlns:a16="http://schemas.microsoft.com/office/drawing/2014/main" val="10000"/>
+                  </a:ext>
+                </a:extLst>
               </a:tr>
               <a:tr h="182880">
                 <a:tc>
@@ -6400,6 +6834,7 @@
                         <a:defRPr sz="1200"/>
                       </a:pPr>
                       <a:r>
+                        <a:rPr dirty="0"/>
                         <a:t>BERT</a:t>
                       </a:r>
                     </a:p>
@@ -6436,6 +6871,11 @@
                   </a:txBody>
                   <a:tcPr/>
                 </a:tc>
+                <a:extLst>
+                  <a:ext uri="{0D108BD9-81ED-4DB2-BD59-A6C34878D82A}">
+                    <a16:rowId xmlns:a16="http://schemas.microsoft.com/office/drawing/2014/main" val="10001"/>
+                  </a:ext>
+                </a:extLst>
               </a:tr>
               <a:tr h="182880">
                 <a:tc>
@@ -6483,6 +6923,11 @@
                   </a:txBody>
                   <a:tcPr/>
                 </a:tc>
+                <a:extLst>
+                  <a:ext uri="{0D108BD9-81ED-4DB2-BD59-A6C34878D82A}">
+                    <a16:rowId xmlns:a16="http://schemas.microsoft.com/office/drawing/2014/main" val="10002"/>
+                  </a:ext>
+                </a:extLst>
               </a:tr>
               <a:tr h="182880">
                 <a:tc>
@@ -6524,12 +6969,18 @@
                         <a:defRPr sz="1200"/>
                       </a:pPr>
                       <a:r>
+                        <a:rPr dirty="0"/>
                         <a:t>[81.78%, 83.94%]</a:t>
                       </a:r>
                     </a:p>
                   </a:txBody>
                   <a:tcPr/>
                 </a:tc>
+                <a:extLst>
+                  <a:ext uri="{0D108BD9-81ED-4DB2-BD59-A6C34878D82A}">
+                    <a16:rowId xmlns:a16="http://schemas.microsoft.com/office/drawing/2014/main" val="10003"/>
+                  </a:ext>
+                </a:extLst>
               </a:tr>
             </a:tbl>
           </a:graphicData>

</xml_diff>